<commit_message>
Added text to notes section of PPP and rewrote the safety properties part
Only the text for user-constraints and safety properties have been added
to the notes.
</commit_message>
<xml_diff>
--- a/Mid-term presentation/DBL Embedded Systems.pptx
+++ b/Mid-term presentation/DBL Embedded Systems.pptx
@@ -112,6 +112,11 @@
       </a:defRPr>
     </a:lvl9pPr>
   </p:defaultTextStyle>
+  <p:extLst>
+    <p:ext uri="{EFAFB233-063F-42B5-8137-9DF3F51BA10A}">
+      <p15:sldGuideLst xmlns:p15="http://schemas.microsoft.com/office/powerpoint/2012/main"/>
+    </p:ext>
+  </p:extLst>
 </p:presentation>
 </file>
 
@@ -673,6 +678,325 @@
     <p:extLst>
       <p:ext uri="{BB962C8B-B14F-4D97-AF65-F5344CB8AC3E}">
         <p14:creationId xmlns:p14="http://schemas.microsoft.com/office/powerpoint/2010/main" val="1890100533"/>
+      </p:ext>
+    </p:extLst>
+  </p:cSld>
+  <p:clrMapOvr>
+    <a:masterClrMapping/>
+  </p:clrMapOvr>
+</p:notes>
+</file>
+
+<file path=ppt/notesSlides/notesSlide3.xml><?xml version="1.0" encoding="utf-8"?>
+<p:notes xmlns:a="http://schemas.openxmlformats.org/drawingml/2006/main" xmlns:r="http://schemas.openxmlformats.org/officeDocument/2006/relationships" xmlns:p="http://schemas.openxmlformats.org/presentationml/2006/main">
+  <p:cSld>
+    <p:spTree>
+      <p:nvGrpSpPr>
+        <p:cNvPr id="1" name=""/>
+        <p:cNvGrpSpPr/>
+        <p:nvPr/>
+      </p:nvGrpSpPr>
+      <p:grpSpPr>
+        <a:xfrm>
+          <a:off x="0" y="0"/>
+          <a:ext cx="0" cy="0"/>
+          <a:chOff x="0" y="0"/>
+          <a:chExt cx="0" cy="0"/>
+        </a:xfrm>
+      </p:grpSpPr>
+      <p:sp>
+        <p:nvSpPr>
+          <p:cNvPr id="2" name="Tijdelijke aanduiding voor dia-afbeelding 1"/>
+          <p:cNvSpPr>
+            <a:spLocks noGrp="1" noRot="1" noChangeAspect="1"/>
+          </p:cNvSpPr>
+          <p:nvPr>
+            <p:ph type="sldImg"/>
+          </p:nvPr>
+        </p:nvSpPr>
+        <p:spPr/>
+      </p:sp>
+      <p:sp>
+        <p:nvSpPr>
+          <p:cNvPr id="3" name="Tijdelijke aanduiding voor notities 2"/>
+          <p:cNvSpPr>
+            <a:spLocks noGrp="1"/>
+          </p:cNvSpPr>
+          <p:nvPr>
+            <p:ph type="body" idx="1"/>
+          </p:nvPr>
+        </p:nvSpPr>
+        <p:spPr/>
+        <p:txBody>
+          <a:bodyPr/>
+          <a:lstStyle/>
+          <a:p>
+            <a:r>
+              <a:rPr lang="en-GB" sz="1200" b="1" kern="1200" dirty="0" smtClean="0">
+                <a:solidFill>
+                  <a:schemeClr val="tx1"/>
+                </a:solidFill>
+                <a:effectLst/>
+                <a:latin typeface="+mn-lt"/>
+                <a:ea typeface="+mn-ea"/>
+                <a:cs typeface="+mn-cs"/>
+              </a:rPr>
+              <a:t>User constraints</a:t>
+            </a:r>
+          </a:p>
+          <a:p>
+            <a:r>
+              <a:rPr lang="nl-NL" sz="1200" b="0" kern="1200" dirty="0" err="1" smtClean="0">
+                <a:solidFill>
+                  <a:schemeClr val="tx1"/>
+                </a:solidFill>
+                <a:effectLst/>
+                <a:latin typeface="+mn-lt"/>
+                <a:ea typeface="+mn-ea"/>
+                <a:cs typeface="+mn-cs"/>
+              </a:rPr>
+              <a:t>Good</a:t>
+            </a:r>
+            <a:r>
+              <a:rPr lang="nl-NL" sz="1200" b="0" kern="1200" baseline="0" dirty="0" smtClean="0">
+                <a:solidFill>
+                  <a:schemeClr val="tx1"/>
+                </a:solidFill>
+                <a:effectLst/>
+                <a:latin typeface="+mn-lt"/>
+                <a:ea typeface="+mn-ea"/>
+                <a:cs typeface="+mn-cs"/>
+              </a:rPr>
+              <a:t> </a:t>
+            </a:r>
+            <a:r>
+              <a:rPr lang="nl-NL" sz="1200" b="0" kern="1200" baseline="0" dirty="0" err="1" smtClean="0">
+                <a:solidFill>
+                  <a:schemeClr val="tx1"/>
+                </a:solidFill>
+                <a:effectLst/>
+                <a:latin typeface="+mn-lt"/>
+                <a:ea typeface="+mn-ea"/>
+                <a:cs typeface="+mn-cs"/>
+              </a:rPr>
+              <a:t>morning</a:t>
+            </a:r>
+            <a:r>
+              <a:rPr lang="nl-NL" sz="1200" b="0" kern="1200" baseline="0" dirty="0" smtClean="0">
+                <a:solidFill>
+                  <a:schemeClr val="tx1"/>
+                </a:solidFill>
+                <a:effectLst/>
+                <a:latin typeface="+mn-lt"/>
+                <a:ea typeface="+mn-ea"/>
+                <a:cs typeface="+mn-cs"/>
+              </a:rPr>
+              <a:t>! </a:t>
+            </a:r>
+            <a:r>
+              <a:rPr lang="nl-NL" sz="1200" b="0" kern="1200" baseline="0" dirty="0" err="1" smtClean="0">
+                <a:solidFill>
+                  <a:schemeClr val="tx1"/>
+                </a:solidFill>
+                <a:effectLst/>
+                <a:latin typeface="+mn-lt"/>
+                <a:ea typeface="+mn-ea"/>
+                <a:cs typeface="+mn-cs"/>
+              </a:rPr>
+              <a:t>So</a:t>
+            </a:r>
+            <a:r>
+              <a:rPr lang="nl-NL" sz="1200" b="0" kern="1200" baseline="0" dirty="0" smtClean="0">
+                <a:solidFill>
+                  <a:schemeClr val="tx1"/>
+                </a:solidFill>
+                <a:effectLst/>
+                <a:latin typeface="+mn-lt"/>
+                <a:ea typeface="+mn-ea"/>
+                <a:cs typeface="+mn-cs"/>
+              </a:rPr>
+              <a:t>, user </a:t>
+            </a:r>
+            <a:r>
+              <a:rPr lang="nl-NL" sz="1200" b="0" kern="1200" baseline="0" dirty="0" err="1" smtClean="0">
+                <a:solidFill>
+                  <a:schemeClr val="tx1"/>
+                </a:solidFill>
+                <a:effectLst/>
+                <a:latin typeface="+mn-lt"/>
+                <a:ea typeface="+mn-ea"/>
+                <a:cs typeface="+mn-cs"/>
+              </a:rPr>
+              <a:t>constraints</a:t>
+            </a:r>
+            <a:r>
+              <a:rPr lang="nl-NL" sz="1200" b="0" kern="1200" baseline="0" dirty="0" smtClean="0">
+                <a:solidFill>
+                  <a:schemeClr val="tx1"/>
+                </a:solidFill>
+                <a:effectLst/>
+                <a:latin typeface="+mn-lt"/>
+                <a:ea typeface="+mn-ea"/>
+                <a:cs typeface="+mn-cs"/>
+              </a:rPr>
+              <a:t>. </a:t>
+            </a:r>
+            <a:endParaRPr lang="en-GB" sz="1200" b="0" kern="1200" dirty="0" smtClean="0">
+              <a:solidFill>
+                <a:schemeClr val="tx1"/>
+              </a:solidFill>
+              <a:effectLst/>
+              <a:latin typeface="+mn-lt"/>
+              <a:ea typeface="+mn-ea"/>
+              <a:cs typeface="+mn-cs"/>
+            </a:endParaRPr>
+          </a:p>
+          <a:p>
+            <a:r>
+              <a:rPr lang="en-GB" sz="1200" kern="1200" dirty="0" smtClean="0">
+                <a:solidFill>
+                  <a:schemeClr val="tx1"/>
+                </a:solidFill>
+                <a:effectLst/>
+                <a:latin typeface="+mn-lt"/>
+                <a:ea typeface="+mn-ea"/>
+                <a:cs typeface="+mn-cs"/>
+              </a:rPr>
+              <a:t>User constraints limits the user’s freedom in controlling the machine. This is necessary so the machine achieves its purpose according to the use-cases, without influencing the condition of the machine. </a:t>
+            </a:r>
+          </a:p>
+          <a:p>
+            <a:r>
+              <a:rPr lang="en-GB" sz="1200" b="1" kern="1200" dirty="0" smtClean="0">
+                <a:solidFill>
+                  <a:schemeClr val="tx1"/>
+                </a:solidFill>
+                <a:effectLst/>
+                <a:latin typeface="+mn-lt"/>
+                <a:ea typeface="+mn-ea"/>
+                <a:cs typeface="+mn-cs"/>
+              </a:rPr>
+              <a:t>Safety properties</a:t>
+            </a:r>
+          </a:p>
+          <a:p>
+            <a:r>
+              <a:rPr lang="en-GB" sz="1200" kern="1200" dirty="0" smtClean="0">
+                <a:solidFill>
+                  <a:schemeClr val="tx1"/>
+                </a:solidFill>
+                <a:effectLst/>
+                <a:latin typeface="+mn-lt"/>
+                <a:ea typeface="+mn-ea"/>
+                <a:cs typeface="+mn-cs"/>
+              </a:rPr>
+              <a:t>Now we know how the machine is going to be used it might be nice to cover safety.</a:t>
+            </a:r>
+            <a:r>
+              <a:rPr lang="en-GB" sz="1200" kern="1200" baseline="0" dirty="0" smtClean="0">
+                <a:solidFill>
+                  <a:schemeClr val="tx1"/>
+                </a:solidFill>
+                <a:effectLst/>
+                <a:latin typeface="+mn-lt"/>
+                <a:ea typeface="+mn-ea"/>
+                <a:cs typeface="+mn-cs"/>
+              </a:rPr>
+              <a:t> We do this with safety properties. </a:t>
+            </a:r>
+            <a:r>
+              <a:rPr lang="en-GB" sz="1200" kern="1200" dirty="0" smtClean="0">
+                <a:solidFill>
+                  <a:schemeClr val="tx1"/>
+                </a:solidFill>
+                <a:effectLst/>
+                <a:latin typeface="+mn-lt"/>
+                <a:ea typeface="+mn-ea"/>
+                <a:cs typeface="+mn-cs"/>
+              </a:rPr>
+              <a:t>A safety property is a description of what needs to be ensured to guarantee</a:t>
+            </a:r>
+            <a:r>
+              <a:rPr lang="en-GB" sz="1200" kern="1200" baseline="0" dirty="0" smtClean="0">
+                <a:solidFill>
+                  <a:schemeClr val="tx1"/>
+                </a:solidFill>
+                <a:effectLst/>
+                <a:latin typeface="+mn-lt"/>
+                <a:ea typeface="+mn-ea"/>
+                <a:cs typeface="+mn-cs"/>
+              </a:rPr>
+              <a:t> safety</a:t>
+            </a:r>
+            <a:r>
+              <a:rPr lang="en-GB" sz="1200" kern="1200" dirty="0" smtClean="0">
+                <a:solidFill>
+                  <a:schemeClr val="tx1"/>
+                </a:solidFill>
+                <a:effectLst/>
+                <a:latin typeface="+mn-lt"/>
+                <a:ea typeface="+mn-ea"/>
+                <a:cs typeface="+mn-cs"/>
+              </a:rPr>
+              <a:t>. To give an example: one of our safety properties is that after pressing an emergency button, within 50 </a:t>
+            </a:r>
+            <a:r>
+              <a:rPr lang="en-GB" sz="1200" kern="1200" dirty="0" err="1" smtClean="0">
+                <a:solidFill>
+                  <a:schemeClr val="tx1"/>
+                </a:solidFill>
+                <a:effectLst/>
+                <a:latin typeface="+mn-lt"/>
+                <a:ea typeface="+mn-ea"/>
+                <a:cs typeface="+mn-cs"/>
+              </a:rPr>
+              <a:t>ms</a:t>
+            </a:r>
+            <a:r>
+              <a:rPr lang="en-GB" sz="1200" kern="1200" dirty="0" smtClean="0">
+                <a:solidFill>
+                  <a:schemeClr val="tx1"/>
+                </a:solidFill>
+                <a:effectLst/>
+                <a:latin typeface="+mn-lt"/>
+                <a:ea typeface="+mn-ea"/>
+                <a:cs typeface="+mn-cs"/>
+              </a:rPr>
+              <a:t> there should be no moving part in the machine. </a:t>
+            </a:r>
+          </a:p>
+          <a:p>
+            <a:endParaRPr lang="en-GB" dirty="0"/>
+          </a:p>
+        </p:txBody>
+      </p:sp>
+      <p:sp>
+        <p:nvSpPr>
+          <p:cNvPr id="4" name="Tijdelijke aanduiding voor dianummer 3"/>
+          <p:cNvSpPr>
+            <a:spLocks noGrp="1"/>
+          </p:cNvSpPr>
+          <p:nvPr>
+            <p:ph type="sldNum" sz="quarter" idx="10"/>
+          </p:nvPr>
+        </p:nvSpPr>
+        <p:spPr/>
+        <p:txBody>
+          <a:bodyPr/>
+          <a:lstStyle/>
+          <a:p>
+            <a:fld id="{0A96A78C-7A1B-4186-9701-837DE127F153}" type="slidenum">
+              <a:rPr lang="en-GB" smtClean="0"/>
+              <a:t>4</a:t>
+            </a:fld>
+            <a:endParaRPr lang="en-GB"/>
+          </a:p>
+        </p:txBody>
+      </p:sp>
+    </p:spTree>
+    <p:extLst>
+      <p:ext uri="{BB962C8B-B14F-4D97-AF65-F5344CB8AC3E}">
+        <p14:creationId xmlns:p14="http://schemas.microsoft.com/office/powerpoint/2010/main" val="2566534291"/>
       </p:ext>
     </p:extLst>
   </p:cSld>

</xml_diff>

<commit_message>
Transformed text user constraints and safety properties into keywords
</commit_message>
<xml_diff>
--- a/Mid-term presentation/DBL Embedded Systems.pptx
+++ b/Mid-term presentation/DBL Embedded Systems.pptx
@@ -741,84 +741,10 @@
                 <a:ea typeface="+mn-ea"/>
                 <a:cs typeface="+mn-cs"/>
               </a:rPr>
-              <a:t>User constraints</a:t>
-            </a:r>
-          </a:p>
-          <a:p>
-            <a:r>
-              <a:rPr lang="nl-NL" sz="1200" b="0" kern="1200" dirty="0" err="1" smtClean="0">
-                <a:solidFill>
-                  <a:schemeClr val="tx1"/>
-                </a:solidFill>
-                <a:effectLst/>
-                <a:latin typeface="+mn-lt"/>
-                <a:ea typeface="+mn-ea"/>
-                <a:cs typeface="+mn-cs"/>
-              </a:rPr>
-              <a:t>Good</a:t>
-            </a:r>
-            <a:r>
-              <a:rPr lang="nl-NL" sz="1200" b="0" kern="1200" baseline="0" dirty="0" smtClean="0">
-                <a:solidFill>
-                  <a:schemeClr val="tx1"/>
-                </a:solidFill>
-                <a:effectLst/>
-                <a:latin typeface="+mn-lt"/>
-                <a:ea typeface="+mn-ea"/>
-                <a:cs typeface="+mn-cs"/>
-              </a:rPr>
-              <a:t> </a:t>
-            </a:r>
-            <a:r>
-              <a:rPr lang="nl-NL" sz="1200" b="0" kern="1200" baseline="0" dirty="0" err="1" smtClean="0">
-                <a:solidFill>
-                  <a:schemeClr val="tx1"/>
-                </a:solidFill>
-                <a:effectLst/>
-                <a:latin typeface="+mn-lt"/>
-                <a:ea typeface="+mn-ea"/>
-                <a:cs typeface="+mn-cs"/>
-              </a:rPr>
-              <a:t>morning</a:t>
-            </a:r>
-            <a:r>
-              <a:rPr lang="nl-NL" sz="1200" b="0" kern="1200" baseline="0" dirty="0" smtClean="0">
-                <a:solidFill>
-                  <a:schemeClr val="tx1"/>
-                </a:solidFill>
-                <a:effectLst/>
-                <a:latin typeface="+mn-lt"/>
-                <a:ea typeface="+mn-ea"/>
-                <a:cs typeface="+mn-cs"/>
-              </a:rPr>
-              <a:t>! </a:t>
-            </a:r>
-            <a:r>
-              <a:rPr lang="nl-NL" sz="1200" b="0" kern="1200" baseline="0" dirty="0" err="1" smtClean="0">
-                <a:solidFill>
-                  <a:schemeClr val="tx1"/>
-                </a:solidFill>
-                <a:effectLst/>
-                <a:latin typeface="+mn-lt"/>
-                <a:ea typeface="+mn-ea"/>
-                <a:cs typeface="+mn-cs"/>
-              </a:rPr>
-              <a:t>So</a:t>
-            </a:r>
-            <a:r>
-              <a:rPr lang="nl-NL" sz="1200" b="0" kern="1200" baseline="0" dirty="0" smtClean="0">
-                <a:solidFill>
-                  <a:schemeClr val="tx1"/>
-                </a:solidFill>
-                <a:effectLst/>
-                <a:latin typeface="+mn-lt"/>
-                <a:ea typeface="+mn-ea"/>
-                <a:cs typeface="+mn-cs"/>
-              </a:rPr>
-              <a:t>, user </a:t>
-            </a:r>
-            <a:r>
-              <a:rPr lang="nl-NL" sz="1200" b="0" kern="1200" baseline="0" dirty="0" err="1" smtClean="0">
+              <a:t>User </a:t>
+            </a:r>
+            <a:r>
+              <a:rPr lang="en-GB" sz="1200" b="1" kern="1200" dirty="0" smtClean="0">
                 <a:solidFill>
                   <a:schemeClr val="tx1"/>
                 </a:solidFill>
@@ -829,27 +755,6 @@
               </a:rPr>
               <a:t>constraints</a:t>
             </a:r>
-            <a:r>
-              <a:rPr lang="nl-NL" sz="1200" b="0" kern="1200" baseline="0" dirty="0" smtClean="0">
-                <a:solidFill>
-                  <a:schemeClr val="tx1"/>
-                </a:solidFill>
-                <a:effectLst/>
-                <a:latin typeface="+mn-lt"/>
-                <a:ea typeface="+mn-ea"/>
-                <a:cs typeface="+mn-cs"/>
-              </a:rPr>
-              <a:t>. </a:t>
-            </a:r>
-            <a:endParaRPr lang="en-GB" sz="1200" b="0" kern="1200" dirty="0" smtClean="0">
-              <a:solidFill>
-                <a:schemeClr val="tx1"/>
-              </a:solidFill>
-              <a:effectLst/>
-              <a:latin typeface="+mn-lt"/>
-              <a:ea typeface="+mn-ea"/>
-              <a:cs typeface="+mn-cs"/>
-            </a:endParaRPr>
           </a:p>
           <a:p>
             <a:r>
@@ -862,8 +767,43 @@
                 <a:ea typeface="+mn-ea"/>
                 <a:cs typeface="+mn-cs"/>
               </a:rPr>
-              <a:t>User constraints limits the user’s freedom in controlling the machine. This is necessary so the machine achieves its purpose according to the use-cases, without influencing the condition of the machine. </a:t>
-            </a:r>
+              <a:t>Limit</a:t>
+            </a:r>
+          </a:p>
+          <a:p>
+            <a:r>
+              <a:rPr lang="en-GB" sz="1200" kern="1200" dirty="0" smtClean="0">
+                <a:solidFill>
+                  <a:schemeClr val="tx1"/>
+                </a:solidFill>
+                <a:effectLst/>
+                <a:latin typeface="+mn-lt"/>
+                <a:ea typeface="+mn-ea"/>
+                <a:cs typeface="+mn-cs"/>
+              </a:rPr>
+              <a:t>Necessity</a:t>
+            </a:r>
+            <a:r>
+              <a:rPr lang="en-GB" sz="1200" kern="1200" baseline="0" dirty="0" smtClean="0">
+                <a:solidFill>
+                  <a:schemeClr val="tx1"/>
+                </a:solidFill>
+                <a:effectLst/>
+                <a:latin typeface="+mn-lt"/>
+                <a:ea typeface="+mn-ea"/>
+                <a:cs typeface="+mn-cs"/>
+              </a:rPr>
+              <a:t>: purpose, use-cases, condition</a:t>
+            </a:r>
+            <a:endParaRPr lang="en-GB" sz="1200" kern="1200" dirty="0" smtClean="0">
+              <a:solidFill>
+                <a:schemeClr val="tx1"/>
+              </a:solidFill>
+              <a:effectLst/>
+              <a:latin typeface="+mn-lt"/>
+              <a:ea typeface="+mn-ea"/>
+              <a:cs typeface="+mn-cs"/>
+            </a:endParaRPr>
           </a:p>
           <a:p>
             <a:r>
@@ -890,82 +830,8 @@
                 <a:ea typeface="+mn-ea"/>
                 <a:cs typeface="+mn-cs"/>
               </a:rPr>
-              <a:t>Now we know how the machine is going to be used it might be nice to cover safety.</a:t>
-            </a:r>
-            <a:r>
-              <a:rPr lang="en-GB" sz="1200" kern="1200" baseline="0" dirty="0" smtClean="0">
-                <a:solidFill>
-                  <a:schemeClr val="tx1"/>
-                </a:solidFill>
-                <a:effectLst/>
-                <a:latin typeface="+mn-lt"/>
-                <a:ea typeface="+mn-ea"/>
-                <a:cs typeface="+mn-cs"/>
-              </a:rPr>
-              <a:t> We do this with safety properties. </a:t>
-            </a:r>
-            <a:r>
-              <a:rPr lang="en-GB" sz="1200" kern="1200" dirty="0" smtClean="0">
-                <a:solidFill>
-                  <a:schemeClr val="tx1"/>
-                </a:solidFill>
-                <a:effectLst/>
-                <a:latin typeface="+mn-lt"/>
-                <a:ea typeface="+mn-ea"/>
-                <a:cs typeface="+mn-cs"/>
-              </a:rPr>
-              <a:t>A safety property is a description of what needs to be ensured to guarantee</a:t>
-            </a:r>
-            <a:r>
-              <a:rPr lang="en-GB" sz="1200" kern="1200" baseline="0" dirty="0" smtClean="0">
-                <a:solidFill>
-                  <a:schemeClr val="tx1"/>
-                </a:solidFill>
-                <a:effectLst/>
-                <a:latin typeface="+mn-lt"/>
-                <a:ea typeface="+mn-ea"/>
-                <a:cs typeface="+mn-cs"/>
-              </a:rPr>
-              <a:t> safety</a:t>
-            </a:r>
-            <a:r>
-              <a:rPr lang="en-GB" sz="1200" kern="1200" dirty="0" smtClean="0">
-                <a:solidFill>
-                  <a:schemeClr val="tx1"/>
-                </a:solidFill>
-                <a:effectLst/>
-                <a:latin typeface="+mn-lt"/>
-                <a:ea typeface="+mn-ea"/>
-                <a:cs typeface="+mn-cs"/>
-              </a:rPr>
-              <a:t>. To give an example: one of our safety properties is that after pressing an emergency button, within 50 </a:t>
-            </a:r>
-            <a:r>
-              <a:rPr lang="en-GB" sz="1200" kern="1200" dirty="0" err="1" smtClean="0">
-                <a:solidFill>
-                  <a:schemeClr val="tx1"/>
-                </a:solidFill>
-                <a:effectLst/>
-                <a:latin typeface="+mn-lt"/>
-                <a:ea typeface="+mn-ea"/>
-                <a:cs typeface="+mn-cs"/>
-              </a:rPr>
-              <a:t>ms</a:t>
-            </a:r>
-            <a:r>
-              <a:rPr lang="en-GB" sz="1200" kern="1200" dirty="0" smtClean="0">
-                <a:solidFill>
-                  <a:schemeClr val="tx1"/>
-                </a:solidFill>
-                <a:effectLst/>
-                <a:latin typeface="+mn-lt"/>
-                <a:ea typeface="+mn-ea"/>
-                <a:cs typeface="+mn-cs"/>
-              </a:rPr>
-              <a:t> there should be no moving part in the machine. </a:t>
-            </a:r>
-          </a:p>
-          <a:p>
+              <a:t>Example</a:t>
+            </a:r>
             <a:endParaRPr lang="en-GB" dirty="0"/>
           </a:p>
         </p:txBody>

</xml_diff>

<commit_message>
Added image conveyer belt
</commit_message>
<xml_diff>
--- a/Mid-term presentation/DBL Embedded Systems.pptx
+++ b/Mid-term presentation/DBL Embedded Systems.pptx
@@ -7873,6 +7873,36 @@
           </a:p>
         </p:txBody>
       </p:sp>
+      <p:pic>
+        <p:nvPicPr>
+          <p:cNvPr id="4" name="Afbeelding 3"/>
+          <p:cNvPicPr>
+            <a:picLocks noChangeAspect="1"/>
+          </p:cNvPicPr>
+          <p:nvPr/>
+        </p:nvPicPr>
+        <p:blipFill>
+          <a:blip r:embed="rId3">
+            <a:extLst>
+              <a:ext uri="{28A0092B-C50C-407E-A947-70E740481C1C}">
+                <a14:useLocalDpi xmlns:a14="http://schemas.microsoft.com/office/drawing/2010/main" val="0"/>
+              </a:ext>
+            </a:extLst>
+          </a:blip>
+          <a:stretch>
+            <a:fillRect/>
+          </a:stretch>
+        </p:blipFill>
+        <p:spPr>
+          <a:xfrm>
+            <a:off x="827700" y="2052925"/>
+            <a:ext cx="6984127" cy="4749206"/>
+          </a:xfrm>
+          <a:prstGeom prst="rect">
+            <a:avLst/>
+          </a:prstGeom>
+        </p:spPr>
+      </p:pic>
     </p:spTree>
     <p:extLst>
       <p:ext uri="{BB962C8B-B14F-4D97-AF65-F5344CB8AC3E}">
@@ -7904,7 +7934,7 @@
                             </p:stCondLst>
                             <p:childTnLst>
                               <p:par>
-                                <p:cTn id="5" presetID="1" presetClass="entr" presetSubtype="0" fill="hold" nodeType="clickEffect">
+                                <p:cTn id="5" presetID="1" presetClass="entr" presetSubtype="0" fill="hold" grpId="0" nodeType="clickEffect">
                                   <p:stCondLst>
                                     <p:cond delay="0"/>
                                   </p:stCondLst>
@@ -7922,6 +7952,33 @@
                                               <p:pRg st="0" end="0"/>
                                             </p:txEl>
                                           </p:spTgt>
+                                        </p:tgtEl>
+                                        <p:attrNameLst>
+                                          <p:attrName>style.visibility</p:attrName>
+                                        </p:attrNameLst>
+                                      </p:cBhvr>
+                                      <p:to>
+                                        <p:strVal val="visible"/>
+                                      </p:to>
+                                    </p:set>
+                                  </p:childTnLst>
+                                </p:cTn>
+                              </p:par>
+                              <p:par>
+                                <p:cTn id="7" presetID="1" presetClass="entr" presetSubtype="0" fill="hold" nodeType="withEffect">
+                                  <p:stCondLst>
+                                    <p:cond delay="0"/>
+                                  </p:stCondLst>
+                                  <p:childTnLst>
+                                    <p:set>
+                                      <p:cBhvr>
+                                        <p:cTn id="8" dur="1" fill="hold">
+                                          <p:stCondLst>
+                                            <p:cond delay="0"/>
+                                          </p:stCondLst>
+                                        </p:cTn>
+                                        <p:tgtEl>
+                                          <p:spTgt spid="4"/>
                                         </p:tgtEl>
                                         <p:attrNameLst>
                                           <p:attrName>style.visibility</p:attrName>
@@ -7961,6 +8018,9 @@
         </p:cTn>
       </p:par>
     </p:tnLst>
+    <p:bldLst>
+      <p:bldP spid="3" grpId="0" build="p"/>
+    </p:bldLst>
   </p:timing>
 </p:sld>
 </file>
@@ -8365,7 +8425,6 @@
               <a:rPr lang="en-GB" dirty="0" smtClean="0"/>
               <a:t>Correctness</a:t>
             </a:r>
-            <a:endParaRPr lang="en-GB" dirty="0" smtClean="0"/>
           </a:p>
           <a:p>
             <a:pPr lvl="1"/>
@@ -8373,7 +8432,6 @@
               <a:rPr lang="en-GB" dirty="0" smtClean="0"/>
               <a:t>Speed</a:t>
             </a:r>
-            <a:endParaRPr lang="en-GB" dirty="0" smtClean="0"/>
           </a:p>
           <a:p>
             <a:pPr lvl="1"/>

</xml_diff>

<commit_message>
Expanded sketch part, added sketch slide and added machine design doc
Machine design doc, so I could work with it, because it wasn't in this
branch
</commit_message>
<xml_diff>
--- a/Mid-term presentation/DBL Embedded Systems.pptx
+++ b/Mid-term presentation/DBL Embedded Systems.pptx
@@ -5,15 +5,16 @@
     <p:sldMasterId id="2147483687" r:id="rId1"/>
   </p:sldMasterIdLst>
   <p:notesMasterIdLst>
-    <p:notesMasterId r:id="rId8"/>
+    <p:notesMasterId r:id="rId9"/>
   </p:notesMasterIdLst>
   <p:sldIdLst>
     <p:sldId id="256" r:id="rId2"/>
     <p:sldId id="257" r:id="rId3"/>
     <p:sldId id="258" r:id="rId4"/>
     <p:sldId id="259" r:id="rId5"/>
-    <p:sldId id="260" r:id="rId6"/>
-    <p:sldId id="261" r:id="rId7"/>
+    <p:sldId id="262" r:id="rId6"/>
+    <p:sldId id="260" r:id="rId7"/>
+    <p:sldId id="261" r:id="rId8"/>
   </p:sldIdLst>
   <p:sldSz cx="9144000" cy="6858000" type="screen4x3"/>
   <p:notesSz cx="6858000" cy="9144000"/>
@@ -8111,13 +8112,6 @@
             </a:r>
             <a:endParaRPr lang="nl-NL" dirty="0" smtClean="0"/>
           </a:p>
-          <a:p>
-            <a:r>
-              <a:rPr lang="nl-NL" dirty="0" smtClean="0"/>
-              <a:t>Sketch</a:t>
-            </a:r>
-            <a:endParaRPr lang="en-GB" dirty="0"/>
-          </a:p>
         </p:txBody>
       </p:sp>
     </p:spTree>
@@ -8285,55 +8279,6 @@
                       </p:childTnLst>
                     </p:cTn>
                   </p:par>
-                  <p:par>
-                    <p:cTn id="15" fill="hold">
-                      <p:stCondLst>
-                        <p:cond delay="indefinite"/>
-                      </p:stCondLst>
-                      <p:childTnLst>
-                        <p:par>
-                          <p:cTn id="16" fill="hold">
-                            <p:stCondLst>
-                              <p:cond delay="0"/>
-                            </p:stCondLst>
-                            <p:childTnLst>
-                              <p:par>
-                                <p:cTn id="17" presetID="1" presetClass="entr" presetSubtype="0" fill="hold" nodeType="clickEffect">
-                                  <p:stCondLst>
-                                    <p:cond delay="0"/>
-                                  </p:stCondLst>
-                                  <p:childTnLst>
-                                    <p:set>
-                                      <p:cBhvr>
-                                        <p:cTn id="18" dur="1" fill="hold">
-                                          <p:stCondLst>
-                                            <p:cond delay="0"/>
-                                          </p:stCondLst>
-                                        </p:cTn>
-                                        <p:tgtEl>
-                                          <p:spTgt spid="3">
-                                            <p:txEl>
-                                              <p:pRg st="3" end="3"/>
-                                            </p:txEl>
-                                          </p:spTgt>
-                                        </p:tgtEl>
-                                        <p:attrNameLst>
-                                          <p:attrName>style.visibility</p:attrName>
-                                        </p:attrNameLst>
-                                      </p:cBhvr>
-                                      <p:to>
-                                        <p:strVal val="visible"/>
-                                      </p:to>
-                                    </p:set>
-                                  </p:childTnLst>
-                                </p:cTn>
-                              </p:par>
-                            </p:childTnLst>
-                          </p:cTn>
-                        </p:par>
-                      </p:childTnLst>
-                    </p:cTn>
-                  </p:par>
                 </p:childTnLst>
               </p:cTn>
               <p:prevCondLst>
@@ -8360,6 +8305,78 @@
 </file>
 
 <file path=ppt/slides/slide5.xml><?xml version="1.0" encoding="utf-8"?>
+<p:sld xmlns:a="http://schemas.openxmlformats.org/drawingml/2006/main" xmlns:r="http://schemas.openxmlformats.org/officeDocument/2006/relationships" xmlns:p="http://schemas.openxmlformats.org/presentationml/2006/main">
+  <p:cSld>
+    <p:spTree>
+      <p:nvGrpSpPr>
+        <p:cNvPr id="1" name=""/>
+        <p:cNvGrpSpPr/>
+        <p:nvPr/>
+      </p:nvGrpSpPr>
+      <p:grpSpPr>
+        <a:xfrm>
+          <a:off x="0" y="0"/>
+          <a:ext cx="0" cy="0"/>
+          <a:chOff x="0" y="0"/>
+          <a:chExt cx="0" cy="0"/>
+        </a:xfrm>
+      </p:grpSpPr>
+      <p:sp>
+        <p:nvSpPr>
+          <p:cNvPr id="2" name="Titel 1"/>
+          <p:cNvSpPr>
+            <a:spLocks noGrp="1"/>
+          </p:cNvSpPr>
+          <p:nvPr>
+            <p:ph type="title"/>
+          </p:nvPr>
+        </p:nvSpPr>
+        <p:spPr/>
+        <p:txBody>
+          <a:bodyPr/>
+          <a:lstStyle/>
+          <a:p>
+            <a:r>
+              <a:rPr lang="nl-NL" dirty="0" smtClean="0"/>
+              <a:t>Sketches</a:t>
+            </a:r>
+            <a:endParaRPr lang="en-GB" dirty="0"/>
+          </a:p>
+        </p:txBody>
+      </p:sp>
+      <p:sp>
+        <p:nvSpPr>
+          <p:cNvPr id="3" name="Tijdelijke aanduiding voor inhoud 2"/>
+          <p:cNvSpPr>
+            <a:spLocks noGrp="1"/>
+          </p:cNvSpPr>
+          <p:nvPr>
+            <p:ph idx="1"/>
+          </p:nvPr>
+        </p:nvSpPr>
+        <p:spPr/>
+        <p:txBody>
+          <a:bodyPr/>
+          <a:lstStyle/>
+          <a:p>
+            <a:endParaRPr lang="en-GB" dirty="0"/>
+          </a:p>
+        </p:txBody>
+      </p:sp>
+    </p:spTree>
+    <p:extLst>
+      <p:ext uri="{BB962C8B-B14F-4D97-AF65-F5344CB8AC3E}">
+        <p14:creationId xmlns:p14="http://schemas.microsoft.com/office/powerpoint/2010/main" val="1162904602"/>
+      </p:ext>
+    </p:extLst>
+  </p:cSld>
+  <p:clrMapOvr>
+    <a:masterClrMapping/>
+  </p:clrMapOvr>
+</p:sld>
+</file>
+
+<file path=ppt/slides/slide6.xml><?xml version="1.0" encoding="utf-8"?>
 <p:sld xmlns:a="http://schemas.openxmlformats.org/drawingml/2006/main" xmlns:r="http://schemas.openxmlformats.org/officeDocument/2006/relationships" xmlns:p="http://schemas.openxmlformats.org/presentationml/2006/main">
   <p:cSld>
     <p:spTree>
@@ -8853,7 +8870,7 @@
 </p:sld>
 </file>
 
-<file path=ppt/slides/slide6.xml><?xml version="1.0" encoding="utf-8"?>
+<file path=ppt/slides/slide7.xml><?xml version="1.0" encoding="utf-8"?>
 <p:sld xmlns:a="http://schemas.openxmlformats.org/drawingml/2006/main" xmlns:r="http://schemas.openxmlformats.org/officeDocument/2006/relationships" xmlns:p="http://schemas.openxmlformats.org/presentationml/2006/main">
   <p:cSld>
     <p:spTree>

</xml_diff>

<commit_message>
Added the actual sketches
Just the feeder btw
</commit_message>
<xml_diff>
--- a/Mid-term presentation/DBL Embedded Systems.pptx
+++ b/Mid-term presentation/DBL Embedded Systems.pptx
@@ -8344,21 +8344,121 @@
           </a:p>
         </p:txBody>
       </p:sp>
-      <p:sp>
-        <p:nvSpPr>
-          <p:cNvPr id="3" name="Tijdelijke aanduiding voor inhoud 2"/>
-          <p:cNvSpPr>
-            <a:spLocks noGrp="1"/>
-          </p:cNvSpPr>
+      <p:pic>
+        <p:nvPicPr>
+          <p:cNvPr id="4" name="Tijdelijke aanduiding voor inhoud 3"/>
+          <p:cNvPicPr>
+            <a:picLocks noGrp="1" noChangeAspect="1"/>
+          </p:cNvPicPr>
           <p:nvPr>
             <p:ph idx="1"/>
           </p:nvPr>
-        </p:nvSpPr>
-        <p:spPr/>
-        <p:txBody>
-          <a:bodyPr/>
+        </p:nvPicPr>
+        <p:blipFill>
+          <a:blip r:embed="rId2">
+            <a:extLst>
+              <a:ext uri="{28A0092B-C50C-407E-A947-70E740481C1C}">
+                <a14:useLocalDpi xmlns:a14="http://schemas.microsoft.com/office/drawing/2010/main" val="0"/>
+              </a:ext>
+            </a:extLst>
+          </a:blip>
+          <a:stretch>
+            <a:fillRect/>
+          </a:stretch>
+        </p:blipFill>
+        <p:spPr>
+          <a:xfrm>
+            <a:off x="656425" y="1300529"/>
+            <a:ext cx="6711950" cy="3091725"/>
+          </a:xfrm>
+        </p:spPr>
+      </p:pic>
+      <p:pic>
+        <p:nvPicPr>
+          <p:cNvPr id="5" name="Afbeelding 4"/>
+          <p:cNvPicPr>
+            <a:picLocks noChangeAspect="1"/>
+          </p:cNvPicPr>
+          <p:nvPr/>
+        </p:nvPicPr>
+        <p:blipFill>
+          <a:blip r:embed="rId3">
+            <a:extLst>
+              <a:ext uri="{28A0092B-C50C-407E-A947-70E740481C1C}">
+                <a14:useLocalDpi xmlns:a14="http://schemas.microsoft.com/office/drawing/2010/main" val="0"/>
+              </a:ext>
+            </a:extLst>
+          </a:blip>
+          <a:stretch>
+            <a:fillRect/>
+          </a:stretch>
+        </p:blipFill>
+        <p:spPr>
+          <a:xfrm>
+            <a:off x="0" y="4605130"/>
+            <a:ext cx="9144000" cy="2252870"/>
+          </a:xfrm>
+          <a:prstGeom prst="rect">
+            <a:avLst/>
+          </a:prstGeom>
+        </p:spPr>
+      </p:pic>
+      <p:sp>
+        <p:nvSpPr>
+          <p:cNvPr id="6" name="Tekstvak 5"/>
+          <p:cNvSpPr txBox="1"/>
+          <p:nvPr/>
+        </p:nvSpPr>
+        <p:spPr>
+          <a:xfrm>
+            <a:off x="3365770" y="2331727"/>
+            <a:ext cx="1206230" cy="369332"/>
+          </a:xfrm>
+          <a:prstGeom prst="rect">
+            <a:avLst/>
+          </a:prstGeom>
+          <a:noFill/>
+        </p:spPr>
+        <p:txBody>
+          <a:bodyPr wrap="square" rtlCol="0">
+            <a:spAutoFit/>
+          </a:bodyPr>
           <a:lstStyle/>
           <a:p>
+            <a:r>
+              <a:rPr lang="nl-NL" dirty="0" smtClean="0"/>
+              <a:t>Design 1</a:t>
+            </a:r>
+            <a:endParaRPr lang="en-GB" dirty="0"/>
+          </a:p>
+        </p:txBody>
+      </p:sp>
+      <p:sp>
+        <p:nvSpPr>
+          <p:cNvPr id="7" name="Tekstvak 6"/>
+          <p:cNvSpPr txBox="1"/>
+          <p:nvPr/>
+        </p:nvSpPr>
+        <p:spPr>
+          <a:xfrm>
+            <a:off x="3365770" y="4686067"/>
+            <a:ext cx="1138136" cy="369332"/>
+          </a:xfrm>
+          <a:prstGeom prst="rect">
+            <a:avLst/>
+          </a:prstGeom>
+          <a:noFill/>
+        </p:spPr>
+        <p:txBody>
+          <a:bodyPr wrap="square" rtlCol="0">
+            <a:spAutoFit/>
+          </a:bodyPr>
+          <a:lstStyle/>
+          <a:p>
+            <a:r>
+              <a:rPr lang="nl-NL" dirty="0" smtClean="0"/>
+              <a:t>Design 2</a:t>
+            </a:r>
             <a:endParaRPr lang="en-GB" dirty="0"/>
           </a:p>
         </p:txBody>

</xml_diff>

<commit_message>
Finished Maarten's part of presentation and added animations to sketches slide
</commit_message>
<xml_diff>
--- a/Mid-term presentation/DBL Embedded Systems.pptx
+++ b/Mid-term presentation/DBL Embedded Systems.pptx
@@ -8473,6 +8473,184 @@
   <p:clrMapOvr>
     <a:masterClrMapping/>
   </p:clrMapOvr>
+  <p:timing>
+    <p:tnLst>
+      <p:par>
+        <p:cTn id="1" dur="indefinite" restart="never" nodeType="tmRoot">
+          <p:childTnLst>
+            <p:seq concurrent="1" nextAc="seek">
+              <p:cTn id="2" dur="indefinite" nodeType="mainSeq">
+                <p:childTnLst>
+                  <p:par>
+                    <p:cTn id="3" fill="hold">
+                      <p:stCondLst>
+                        <p:cond delay="indefinite"/>
+                      </p:stCondLst>
+                      <p:childTnLst>
+                        <p:par>
+                          <p:cTn id="4" fill="hold">
+                            <p:stCondLst>
+                              <p:cond delay="0"/>
+                            </p:stCondLst>
+                            <p:childTnLst>
+                              <p:par>
+                                <p:cTn id="5" presetID="1" presetClass="entr" presetSubtype="0" fill="hold" nodeType="clickEffect">
+                                  <p:stCondLst>
+                                    <p:cond delay="0"/>
+                                  </p:stCondLst>
+                                  <p:childTnLst>
+                                    <p:set>
+                                      <p:cBhvr>
+                                        <p:cTn id="6" dur="1" fill="hold">
+                                          <p:stCondLst>
+                                            <p:cond delay="0"/>
+                                          </p:stCondLst>
+                                        </p:cTn>
+                                        <p:tgtEl>
+                                          <p:spTgt spid="4"/>
+                                        </p:tgtEl>
+                                        <p:attrNameLst>
+                                          <p:attrName>style.visibility</p:attrName>
+                                        </p:attrNameLst>
+                                      </p:cBhvr>
+                                      <p:to>
+                                        <p:strVal val="visible"/>
+                                      </p:to>
+                                    </p:set>
+                                  </p:childTnLst>
+                                </p:cTn>
+                              </p:par>
+                              <p:par>
+                                <p:cTn id="7" presetID="1" presetClass="entr" presetSubtype="0" fill="hold" grpId="0" nodeType="withEffect">
+                                  <p:stCondLst>
+                                    <p:cond delay="0"/>
+                                  </p:stCondLst>
+                                  <p:childTnLst>
+                                    <p:set>
+                                      <p:cBhvr>
+                                        <p:cTn id="8" dur="1" fill="hold">
+                                          <p:stCondLst>
+                                            <p:cond delay="0"/>
+                                          </p:stCondLst>
+                                        </p:cTn>
+                                        <p:tgtEl>
+                                          <p:spTgt spid="6"/>
+                                        </p:tgtEl>
+                                        <p:attrNameLst>
+                                          <p:attrName>style.visibility</p:attrName>
+                                        </p:attrNameLst>
+                                      </p:cBhvr>
+                                      <p:to>
+                                        <p:strVal val="visible"/>
+                                      </p:to>
+                                    </p:set>
+                                  </p:childTnLst>
+                                </p:cTn>
+                              </p:par>
+                            </p:childTnLst>
+                          </p:cTn>
+                        </p:par>
+                      </p:childTnLst>
+                    </p:cTn>
+                  </p:par>
+                  <p:par>
+                    <p:cTn id="9" fill="hold">
+                      <p:stCondLst>
+                        <p:cond delay="indefinite"/>
+                      </p:stCondLst>
+                      <p:childTnLst>
+                        <p:par>
+                          <p:cTn id="10" fill="hold">
+                            <p:stCondLst>
+                              <p:cond delay="0"/>
+                            </p:stCondLst>
+                            <p:childTnLst>
+                              <p:par>
+                                <p:cTn id="11" presetID="1" presetClass="entr" presetSubtype="0" fill="hold" nodeType="clickEffect">
+                                  <p:stCondLst>
+                                    <p:cond delay="0"/>
+                                  </p:stCondLst>
+                                  <p:childTnLst>
+                                    <p:set>
+                                      <p:cBhvr>
+                                        <p:cTn id="12" dur="1" fill="hold">
+                                          <p:stCondLst>
+                                            <p:cond delay="0"/>
+                                          </p:stCondLst>
+                                        </p:cTn>
+                                        <p:tgtEl>
+                                          <p:spTgt spid="5"/>
+                                        </p:tgtEl>
+                                        <p:attrNameLst>
+                                          <p:attrName>style.visibility</p:attrName>
+                                        </p:attrNameLst>
+                                      </p:cBhvr>
+                                      <p:to>
+                                        <p:strVal val="visible"/>
+                                      </p:to>
+                                    </p:set>
+                                  </p:childTnLst>
+                                </p:cTn>
+                              </p:par>
+                              <p:par>
+                                <p:cTn id="13" presetID="1" presetClass="entr" presetSubtype="0" fill="hold" grpId="0" nodeType="withEffect">
+                                  <p:stCondLst>
+                                    <p:cond delay="0"/>
+                                  </p:stCondLst>
+                                  <p:childTnLst>
+                                    <p:set>
+                                      <p:cBhvr>
+                                        <p:cTn id="14" dur="1" fill="hold">
+                                          <p:stCondLst>
+                                            <p:cond delay="0"/>
+                                          </p:stCondLst>
+                                        </p:cTn>
+                                        <p:tgtEl>
+                                          <p:spTgt spid="7"/>
+                                        </p:tgtEl>
+                                        <p:attrNameLst>
+                                          <p:attrName>style.visibility</p:attrName>
+                                        </p:attrNameLst>
+                                      </p:cBhvr>
+                                      <p:to>
+                                        <p:strVal val="visible"/>
+                                      </p:to>
+                                    </p:set>
+                                  </p:childTnLst>
+                                </p:cTn>
+                              </p:par>
+                            </p:childTnLst>
+                          </p:cTn>
+                        </p:par>
+                      </p:childTnLst>
+                    </p:cTn>
+                  </p:par>
+                </p:childTnLst>
+              </p:cTn>
+              <p:prevCondLst>
+                <p:cond evt="onPrev" delay="0">
+                  <p:tgtEl>
+                    <p:sldTgt/>
+                  </p:tgtEl>
+                </p:cond>
+              </p:prevCondLst>
+              <p:nextCondLst>
+                <p:cond evt="onNext" delay="0">
+                  <p:tgtEl>
+                    <p:sldTgt/>
+                  </p:tgtEl>
+                </p:cond>
+              </p:nextCondLst>
+            </p:seq>
+          </p:childTnLst>
+        </p:cTn>
+      </p:par>
+    </p:tnLst>
+    <p:bldLst>
+      <p:bldP spid="6" grpId="0"/>
+      <p:bldP spid="7" grpId="0"/>
+    </p:bldLst>
+  </p:timing>
 </p:sld>
 </file>
 

</xml_diff>

<commit_message>
Added notes about Sketch
Will becom keywords
</commit_message>
<xml_diff>
--- a/Mid-term presentation/DBL Embedded Systems.pptx
+++ b/Mid-term presentation/DBL Embedded Systems.pptx
@@ -852,6 +852,230 @@
     <p:extLst>
       <p:ext uri="{BB962C8B-B14F-4D97-AF65-F5344CB8AC3E}">
         <p14:creationId xmlns:p14="http://schemas.microsoft.com/office/powerpoint/2010/main" val="2566534291"/>
+      </p:ext>
+    </p:extLst>
+  </p:cSld>
+  <p:clrMapOvr>
+    <a:masterClrMapping/>
+  </p:clrMapOvr>
+</p:notes>
+</file>
+
+<file path=ppt/notesSlides/notesSlide4.xml><?xml version="1.0" encoding="utf-8"?>
+<p:notes xmlns:a="http://schemas.openxmlformats.org/drawingml/2006/main" xmlns:r="http://schemas.openxmlformats.org/officeDocument/2006/relationships" xmlns:p="http://schemas.openxmlformats.org/presentationml/2006/main">
+  <p:cSld>
+    <p:spTree>
+      <p:nvGrpSpPr>
+        <p:cNvPr id="1" name=""/>
+        <p:cNvGrpSpPr/>
+        <p:nvPr/>
+      </p:nvGrpSpPr>
+      <p:grpSpPr>
+        <a:xfrm>
+          <a:off x="0" y="0"/>
+          <a:ext cx="0" cy="0"/>
+          <a:chOff x="0" y="0"/>
+          <a:chExt cx="0" cy="0"/>
+        </a:xfrm>
+      </p:grpSpPr>
+      <p:sp>
+        <p:nvSpPr>
+          <p:cNvPr id="2" name="Tijdelijke aanduiding voor dia-afbeelding 1"/>
+          <p:cNvSpPr>
+            <a:spLocks noGrp="1" noRot="1" noChangeAspect="1"/>
+          </p:cNvSpPr>
+          <p:nvPr>
+            <p:ph type="sldImg"/>
+          </p:nvPr>
+        </p:nvSpPr>
+        <p:spPr/>
+      </p:sp>
+      <p:sp>
+        <p:nvSpPr>
+          <p:cNvPr id="3" name="Tijdelijke aanduiding voor notities 2"/>
+          <p:cNvSpPr>
+            <a:spLocks noGrp="1"/>
+          </p:cNvSpPr>
+          <p:nvPr>
+            <p:ph type="body" idx="1"/>
+          </p:nvPr>
+        </p:nvSpPr>
+        <p:spPr/>
+        <p:txBody>
+          <a:bodyPr/>
+          <a:lstStyle/>
+          <a:p>
+            <a:r>
+              <a:rPr lang="en-GB" sz="1200" b="1" kern="1200" dirty="0" smtClean="0">
+                <a:solidFill>
+                  <a:schemeClr val="tx1"/>
+                </a:solidFill>
+                <a:effectLst/>
+                <a:latin typeface="+mn-lt"/>
+                <a:ea typeface="+mn-ea"/>
+                <a:cs typeface="+mn-cs"/>
+              </a:rPr>
+              <a:t>Sketch</a:t>
+            </a:r>
+          </a:p>
+          <a:p>
+            <a:r>
+              <a:rPr lang="en-GB" sz="1200" kern="1200" dirty="0" smtClean="0">
+                <a:solidFill>
+                  <a:schemeClr val="tx1"/>
+                </a:solidFill>
+                <a:effectLst/>
+                <a:latin typeface="+mn-lt"/>
+                <a:ea typeface="+mn-ea"/>
+                <a:cs typeface="+mn-cs"/>
+              </a:rPr>
+              <a:t>Now we were talking about the use-cases, user constraints and safety properties, you might have forgotten that we were talking about machine design. So let’s take a design decision we made. </a:t>
+            </a:r>
+          </a:p>
+          <a:p>
+            <a:r>
+              <a:rPr lang="en-GB" sz="1200" kern="1200" dirty="0" smtClean="0">
+                <a:solidFill>
+                  <a:schemeClr val="tx1"/>
+                </a:solidFill>
+                <a:effectLst/>
+                <a:latin typeface="+mn-lt"/>
+                <a:ea typeface="+mn-ea"/>
+                <a:cs typeface="+mn-cs"/>
+              </a:rPr>
+              <a:t>For the use-case “Sort unsorted discs” we need something that disposes discs one by one on the conveyer belt. We came up with two designs and build both of them. </a:t>
+            </a:r>
+          </a:p>
+          <a:p>
+            <a:r>
+              <a:rPr lang="en-GB" sz="1200" kern="1200" dirty="0" smtClean="0">
+                <a:solidFill>
+                  <a:schemeClr val="tx1"/>
+                </a:solidFill>
+                <a:effectLst/>
+                <a:latin typeface="+mn-lt"/>
+                <a:ea typeface="+mn-ea"/>
+                <a:cs typeface="+mn-cs"/>
+              </a:rPr>
+              <a:t>*Show designs*</a:t>
+            </a:r>
+          </a:p>
+          <a:p>
+            <a:r>
+              <a:rPr lang="en-GB" sz="1200" kern="1200" dirty="0" smtClean="0">
+                <a:solidFill>
+                  <a:schemeClr val="tx1"/>
+                </a:solidFill>
+                <a:effectLst/>
+                <a:latin typeface="+mn-lt"/>
+                <a:ea typeface="+mn-ea"/>
+                <a:cs typeface="+mn-cs"/>
+              </a:rPr>
+              <a:t>Both designs make use of the hollow tubes stacked on top of each other. This is convenient because they are reliable in containing the discs and fast because if the bottom disc is removed the next disc, if any, will drop down to the position of the first disc. Robustness is covered too, because there are few parts that may come loose. For user accessibility it’s easy to put new discs to be processed at the top of the tubes. </a:t>
+            </a:r>
+          </a:p>
+          <a:p>
+            <a:r>
+              <a:rPr lang="en-GB" sz="1200" kern="1200" dirty="0" smtClean="0">
+                <a:solidFill>
+                  <a:schemeClr val="tx1"/>
+                </a:solidFill>
+                <a:effectLst/>
+                <a:latin typeface="+mn-lt"/>
+                <a:ea typeface="+mn-ea"/>
+                <a:cs typeface="+mn-cs"/>
+              </a:rPr>
+              <a:t>In the first design there’s a turning wheel with a cam that is able to push the discs one by one onto the belt. A wall to the left of the container makes sure the disk is pushed up and not to the left. </a:t>
+            </a:r>
+          </a:p>
+          <a:p>
+            <a:r>
+              <a:rPr lang="en-GB" sz="1200" kern="1200" dirty="0" smtClean="0">
+                <a:solidFill>
+                  <a:schemeClr val="tx1"/>
+                </a:solidFill>
+                <a:effectLst/>
+                <a:latin typeface="+mn-lt"/>
+                <a:ea typeface="+mn-ea"/>
+                <a:cs typeface="+mn-cs"/>
+              </a:rPr>
+              <a:t>In the second design a moving block would push the discs onto the belt. The block would be driven by a lever attached to a rotating wheel. </a:t>
+            </a:r>
+          </a:p>
+          <a:p>
+            <a:r>
+              <a:rPr lang="en-GB" sz="1200" kern="1200" dirty="0" smtClean="0">
+                <a:solidFill>
+                  <a:schemeClr val="tx1"/>
+                </a:solidFill>
+                <a:effectLst/>
+                <a:latin typeface="+mn-lt"/>
+                <a:ea typeface="+mn-ea"/>
+                <a:cs typeface="+mn-cs"/>
+              </a:rPr>
+              <a:t>Both designs are consistent with the use-case. Tudor will tell you more about our priorities, but both designs were reliable and there was no difference in speed. Both designs didn’t hinder the user, so user accessibility is all right. At the end we chose for the first design, because it was easier to build, had less parts and was a lot more compact. </a:t>
+            </a:r>
+          </a:p>
+          <a:p>
+            <a:r>
+              <a:rPr lang="en-GB" sz="1200" kern="1200" dirty="0" smtClean="0">
+                <a:solidFill>
+                  <a:schemeClr val="tx1"/>
+                </a:solidFill>
+                <a:effectLst/>
+                <a:latin typeface="+mn-lt"/>
+                <a:ea typeface="+mn-ea"/>
+                <a:cs typeface="+mn-cs"/>
+              </a:rPr>
+              <a:t> </a:t>
+            </a:r>
+          </a:p>
+          <a:p>
+            <a:r>
+              <a:rPr lang="en-GB" sz="1200" kern="1200" smtClean="0">
+                <a:solidFill>
+                  <a:schemeClr val="tx1"/>
+                </a:solidFill>
+                <a:effectLst/>
+                <a:latin typeface="+mn-lt"/>
+                <a:ea typeface="+mn-ea"/>
+                <a:cs typeface="+mn-cs"/>
+              </a:rPr>
+              <a:t>Then now I will give the word to Tudor, so he can tell you about design decisions. </a:t>
+            </a:r>
+          </a:p>
+          <a:p>
+            <a:endParaRPr lang="en-GB"/>
+          </a:p>
+        </p:txBody>
+      </p:sp>
+      <p:sp>
+        <p:nvSpPr>
+          <p:cNvPr id="4" name="Tijdelijke aanduiding voor dianummer 3"/>
+          <p:cNvSpPr>
+            <a:spLocks noGrp="1"/>
+          </p:cNvSpPr>
+          <p:nvPr>
+            <p:ph type="sldNum" sz="quarter" idx="10"/>
+          </p:nvPr>
+        </p:nvSpPr>
+        <p:spPr/>
+        <p:txBody>
+          <a:bodyPr/>
+          <a:lstStyle/>
+          <a:p>
+            <a:fld id="{0A96A78C-7A1B-4186-9701-837DE127F153}" type="slidenum">
+              <a:rPr lang="en-GB" smtClean="0"/>
+              <a:t>5</a:t>
+            </a:fld>
+            <a:endParaRPr lang="en-GB"/>
+          </a:p>
+        </p:txBody>
+      </p:sp>
+    </p:spTree>
+    <p:extLst>
+      <p:ext uri="{BB962C8B-B14F-4D97-AF65-F5344CB8AC3E}">
+        <p14:creationId xmlns:p14="http://schemas.microsoft.com/office/powerpoint/2010/main" val="521095497"/>
       </p:ext>
     </p:extLst>
   </p:cSld>
@@ -8355,7 +8579,7 @@
           </p:nvPr>
         </p:nvPicPr>
         <p:blipFill>
-          <a:blip r:embed="rId2">
+          <a:blip r:embed="rId3">
             <a:extLst>
               <a:ext uri="{28A0092B-C50C-407E-A947-70E740481C1C}">
                 <a14:useLocalDpi xmlns:a14="http://schemas.microsoft.com/office/drawing/2010/main" val="0"/>
@@ -8382,7 +8606,7 @@
           <p:nvPr/>
         </p:nvPicPr>
         <p:blipFill>
-          <a:blip r:embed="rId3">
+          <a:blip r:embed="rId4">
             <a:extLst>
               <a:ext uri="{28A0092B-C50C-407E-A947-70E740481C1C}">
                 <a14:useLocalDpi xmlns:a14="http://schemas.microsoft.com/office/drawing/2010/main" val="0"/>

</xml_diff>

<commit_message>
Added seventh priority, changed wording in own part, fixed spelling errors in Maarten's part.
</commit_message>
<xml_diff>
--- a/Mid-term presentation/DBL Embedded Systems.pptx
+++ b/Mid-term presentation/DBL Embedded Systems.pptx
@@ -203,7 +203,7 @@
           <a:p>
             <a:fld id="{6ACF7646-F517-410B-A50A-CA20C9403921}" type="datetimeFigureOut">
               <a:rPr lang="en-GB" smtClean="0"/>
-              <a:t>26/02/2015</a:t>
+              <a:t>27/02/2015</a:t>
             </a:fld>
             <a:endParaRPr lang="en-GB"/>
           </a:p>
@@ -362,7 +362,7 @@
           <a:p>
             <a:fld id="{0A96A78C-7A1B-4186-9701-837DE127F153}" type="slidenum">
               <a:rPr lang="en-GB" smtClean="0"/>
-              <a:t>‹nr.›</a:t>
+              <a:t>‹#›</a:t>
             </a:fld>
             <a:endParaRPr lang="en-GB"/>
           </a:p>
@@ -1048,7 +1048,7 @@
             <a:fld id="{B61BEF0D-F0BB-DE4B-95CE-6DB70DBA9567}" type="datetimeFigureOut">
               <a:rPr lang="en-US" smtClean="0"/>
               <a:pPr/>
-              <a:t>2/26/2015</a:t>
+              <a:t>2/27/2015</a:t>
             </a:fld>
             <a:endParaRPr lang="en-US" dirty="0"/>
           </a:p>
@@ -1091,7 +1091,7 @@
             <a:fld id="{D57F1E4F-1CFF-5643-939E-217C01CDF565}" type="slidenum">
               <a:rPr lang="en-US" smtClean="0"/>
               <a:pPr/>
-              <a:t>‹nr.›</a:t>
+              <a:t>‹#›</a:t>
             </a:fld>
             <a:endParaRPr lang="en-US" dirty="0"/>
           </a:p>
@@ -1325,7 +1325,7 @@
             <a:fld id="{B61BEF0D-F0BB-DE4B-95CE-6DB70DBA9567}" type="datetimeFigureOut">
               <a:rPr lang="en-US" smtClean="0"/>
               <a:pPr/>
-              <a:t>2/26/2015</a:t>
+              <a:t>2/27/2015</a:t>
             </a:fld>
             <a:endParaRPr lang="en-US" dirty="0"/>
           </a:p>
@@ -1368,7 +1368,7 @@
             <a:fld id="{D57F1E4F-1CFF-5643-939E-217C01CDF565}" type="slidenum">
               <a:rPr lang="en-US" smtClean="0"/>
               <a:pPr/>
-              <a:t>‹nr.›</a:t>
+              <a:t>‹#›</a:t>
             </a:fld>
             <a:endParaRPr lang="en-US" dirty="0"/>
           </a:p>
@@ -1521,7 +1521,7 @@
             <a:fld id="{B61BEF0D-F0BB-DE4B-95CE-6DB70DBA9567}" type="datetimeFigureOut">
               <a:rPr lang="en-US" smtClean="0"/>
               <a:pPr/>
-              <a:t>2/26/2015</a:t>
+              <a:t>2/27/2015</a:t>
             </a:fld>
             <a:endParaRPr lang="en-US" dirty="0"/>
           </a:p>
@@ -1564,7 +1564,7 @@
             <a:fld id="{D57F1E4F-1CFF-5643-939E-217C01CDF565}" type="slidenum">
               <a:rPr lang="en-US" smtClean="0"/>
               <a:pPr/>
-              <a:t>‹nr.›</a:t>
+              <a:t>‹#›</a:t>
             </a:fld>
             <a:endParaRPr lang="en-US" dirty="0"/>
           </a:p>
@@ -1796,7 +1796,7 @@
             <a:fld id="{B61BEF0D-F0BB-DE4B-95CE-6DB70DBA9567}" type="datetimeFigureOut">
               <a:rPr lang="en-US" smtClean="0"/>
               <a:pPr/>
-              <a:t>2/26/2015</a:t>
+              <a:t>2/27/2015</a:t>
             </a:fld>
             <a:endParaRPr lang="en-US" dirty="0"/>
           </a:p>
@@ -1839,7 +1839,7 @@
             <a:fld id="{D57F1E4F-1CFF-5643-939E-217C01CDF565}" type="slidenum">
               <a:rPr lang="en-US" smtClean="0"/>
               <a:pPr/>
-              <a:t>‹nr.›</a:t>
+              <a:t>‹#›</a:t>
             </a:fld>
             <a:endParaRPr lang="en-US" dirty="0"/>
           </a:p>
@@ -2139,7 +2139,7 @@
             <a:fld id="{B61BEF0D-F0BB-DE4B-95CE-6DB70DBA9567}" type="datetimeFigureOut">
               <a:rPr lang="en-US" smtClean="0"/>
               <a:pPr/>
-              <a:t>2/26/2015</a:t>
+              <a:t>2/27/2015</a:t>
             </a:fld>
             <a:endParaRPr lang="en-US" dirty="0"/>
           </a:p>
@@ -2182,7 +2182,7 @@
             <a:fld id="{D57F1E4F-1CFF-5643-939E-217C01CDF565}" type="slidenum">
               <a:rPr lang="en-US" smtClean="0"/>
               <a:pPr/>
-              <a:t>‹nr.›</a:t>
+              <a:t>‹#›</a:t>
             </a:fld>
             <a:endParaRPr lang="en-US" dirty="0"/>
           </a:p>
@@ -2764,7 +2764,7 @@
             <a:fld id="{B61BEF0D-F0BB-DE4B-95CE-6DB70DBA9567}" type="datetimeFigureOut">
               <a:rPr lang="en-US" smtClean="0"/>
               <a:pPr/>
-              <a:t>2/26/2015</a:t>
+              <a:t>2/27/2015</a:t>
             </a:fld>
             <a:endParaRPr lang="en-US" dirty="0"/>
           </a:p>
@@ -2807,7 +2807,7 @@
             <a:fld id="{D57F1E4F-1CFF-5643-939E-217C01CDF565}" type="slidenum">
               <a:rPr lang="en-US" smtClean="0"/>
               <a:pPr/>
-              <a:t>‹nr.›</a:t>
+              <a:t>‹#›</a:t>
             </a:fld>
             <a:endParaRPr lang="en-US" dirty="0"/>
           </a:p>
@@ -3626,7 +3626,7 @@
             <a:fld id="{B61BEF0D-F0BB-DE4B-95CE-6DB70DBA9567}" type="datetimeFigureOut">
               <a:rPr lang="en-US" smtClean="0"/>
               <a:pPr/>
-              <a:t>2/26/2015</a:t>
+              <a:t>2/27/2015</a:t>
             </a:fld>
             <a:endParaRPr lang="en-US" dirty="0"/>
           </a:p>
@@ -3669,7 +3669,7 @@
             <a:fld id="{D57F1E4F-1CFF-5643-939E-217C01CDF565}" type="slidenum">
               <a:rPr lang="en-US" smtClean="0"/>
               <a:pPr/>
-              <a:t>‹nr.›</a:t>
+              <a:t>‹#›</a:t>
             </a:fld>
             <a:endParaRPr lang="en-US" dirty="0"/>
           </a:p>
@@ -3798,7 +3798,7 @@
             <a:fld id="{B61BEF0D-F0BB-DE4B-95CE-6DB70DBA9567}" type="datetimeFigureOut">
               <a:rPr lang="en-US" smtClean="0"/>
               <a:pPr/>
-              <a:t>2/26/2015</a:t>
+              <a:t>2/27/2015</a:t>
             </a:fld>
             <a:endParaRPr lang="en-US" dirty="0"/>
           </a:p>
@@ -3841,7 +3841,7 @@
             <a:fld id="{D57F1E4F-1CFF-5643-939E-217C01CDF565}" type="slidenum">
               <a:rPr lang="en-US" smtClean="0"/>
               <a:pPr/>
-              <a:t>‹nr.›</a:t>
+              <a:t>‹#›</a:t>
             </a:fld>
             <a:endParaRPr lang="en-US" dirty="0"/>
           </a:p>
@@ -3980,7 +3980,7 @@
             <a:fld id="{B61BEF0D-F0BB-DE4B-95CE-6DB70DBA9567}" type="datetimeFigureOut">
               <a:rPr lang="en-US" smtClean="0"/>
               <a:pPr/>
-              <a:t>2/26/2015</a:t>
+              <a:t>2/27/2015</a:t>
             </a:fld>
             <a:endParaRPr lang="en-US" dirty="0"/>
           </a:p>
@@ -4023,7 +4023,7 @@
             <a:fld id="{D57F1E4F-1CFF-5643-939E-217C01CDF565}" type="slidenum">
               <a:rPr lang="en-US" smtClean="0"/>
               <a:pPr/>
-              <a:t>‹nr.›</a:t>
+              <a:t>‹#›</a:t>
             </a:fld>
             <a:endParaRPr lang="en-US" dirty="0"/>
           </a:p>
@@ -4152,7 +4152,7 @@
             <a:fld id="{B61BEF0D-F0BB-DE4B-95CE-6DB70DBA9567}" type="datetimeFigureOut">
               <a:rPr lang="en-US" smtClean="0"/>
               <a:pPr/>
-              <a:t>2/26/2015</a:t>
+              <a:t>2/27/2015</a:t>
             </a:fld>
             <a:endParaRPr lang="en-US" dirty="0"/>
           </a:p>
@@ -4195,7 +4195,7 @@
             <a:fld id="{D57F1E4F-1CFF-5643-939E-217C01CDF565}" type="slidenum">
               <a:rPr lang="en-US" smtClean="0"/>
               <a:pPr/>
-              <a:t>‹nr.›</a:t>
+              <a:t>‹#›</a:t>
             </a:fld>
             <a:endParaRPr lang="en-US" dirty="0"/>
           </a:p>
@@ -4401,7 +4401,7 @@
             <a:fld id="{B61BEF0D-F0BB-DE4B-95CE-6DB70DBA9567}" type="datetimeFigureOut">
               <a:rPr lang="en-US" smtClean="0"/>
               <a:pPr/>
-              <a:t>2/26/2015</a:t>
+              <a:t>2/27/2015</a:t>
             </a:fld>
             <a:endParaRPr lang="en-US" dirty="0"/>
           </a:p>
@@ -4444,7 +4444,7 @@
             <a:fld id="{D57F1E4F-1CFF-5643-939E-217C01CDF565}" type="slidenum">
               <a:rPr lang="en-US" smtClean="0"/>
               <a:pPr/>
-              <a:t>‹nr.›</a:t>
+              <a:t>‹#›</a:t>
             </a:fld>
             <a:endParaRPr lang="en-US" dirty="0"/>
           </a:p>
@@ -4695,7 +4695,7 @@
             <a:fld id="{B61BEF0D-F0BB-DE4B-95CE-6DB70DBA9567}" type="datetimeFigureOut">
               <a:rPr lang="en-US" smtClean="0"/>
               <a:pPr/>
-              <a:t>2/26/2015</a:t>
+              <a:t>2/27/2015</a:t>
             </a:fld>
             <a:endParaRPr lang="en-US" dirty="0"/>
           </a:p>
@@ -4738,7 +4738,7 @@
             <a:fld id="{D57F1E4F-1CFF-5643-939E-217C01CDF565}" type="slidenum">
               <a:rPr lang="en-US" smtClean="0"/>
               <a:pPr/>
-              <a:t>‹nr.›</a:t>
+              <a:t>‹#›</a:t>
             </a:fld>
             <a:endParaRPr lang="en-US" dirty="0"/>
           </a:p>
@@ -5141,7 +5141,7 @@
             <a:fld id="{B61BEF0D-F0BB-DE4B-95CE-6DB70DBA9567}" type="datetimeFigureOut">
               <a:rPr lang="en-US" smtClean="0"/>
               <a:pPr/>
-              <a:t>2/26/2015</a:t>
+              <a:t>2/27/2015</a:t>
             </a:fld>
             <a:endParaRPr lang="en-US" dirty="0"/>
           </a:p>
@@ -5184,7 +5184,7 @@
             <a:fld id="{D57F1E4F-1CFF-5643-939E-217C01CDF565}" type="slidenum">
               <a:rPr lang="en-US" smtClean="0"/>
               <a:pPr/>
-              <a:t>‹nr.›</a:t>
+              <a:t>‹#›</a:t>
             </a:fld>
             <a:endParaRPr lang="en-US" dirty="0"/>
           </a:p>
@@ -5261,7 +5261,7 @@
             <a:fld id="{B61BEF0D-F0BB-DE4B-95CE-6DB70DBA9567}" type="datetimeFigureOut">
               <a:rPr lang="en-US" smtClean="0"/>
               <a:pPr/>
-              <a:t>2/26/2015</a:t>
+              <a:t>2/27/2015</a:t>
             </a:fld>
             <a:endParaRPr lang="en-US" dirty="0"/>
           </a:p>
@@ -5304,7 +5304,7 @@
             <a:fld id="{D57F1E4F-1CFF-5643-939E-217C01CDF565}" type="slidenum">
               <a:rPr lang="en-US" smtClean="0"/>
               <a:pPr/>
-              <a:t>‹nr.›</a:t>
+              <a:t>‹#›</a:t>
             </a:fld>
             <a:endParaRPr lang="en-US" dirty="0"/>
           </a:p>
@@ -5358,7 +5358,7 @@
             <a:fld id="{B61BEF0D-F0BB-DE4B-95CE-6DB70DBA9567}" type="datetimeFigureOut">
               <a:rPr lang="en-US" smtClean="0"/>
               <a:pPr/>
-              <a:t>2/26/2015</a:t>
+              <a:t>2/27/2015</a:t>
             </a:fld>
             <a:endParaRPr lang="en-US" dirty="0"/>
           </a:p>
@@ -5401,7 +5401,7 @@
             <a:fld id="{D57F1E4F-1CFF-5643-939E-217C01CDF565}" type="slidenum">
               <a:rPr lang="en-US" smtClean="0"/>
               <a:pPr/>
-              <a:t>‹nr.›</a:t>
+              <a:t>‹#›</a:t>
             </a:fld>
             <a:endParaRPr lang="en-US" dirty="0"/>
           </a:p>
@@ -5639,7 +5639,7 @@
             <a:fld id="{B61BEF0D-F0BB-DE4B-95CE-6DB70DBA9567}" type="datetimeFigureOut">
               <a:rPr lang="en-US" smtClean="0"/>
               <a:pPr/>
-              <a:t>2/26/2015</a:t>
+              <a:t>2/27/2015</a:t>
             </a:fld>
             <a:endParaRPr lang="en-US" dirty="0"/>
           </a:p>
@@ -5682,7 +5682,7 @@
             <a:fld id="{D57F1E4F-1CFF-5643-939E-217C01CDF565}" type="slidenum">
               <a:rPr lang="en-US" smtClean="0"/>
               <a:pPr/>
-              <a:t>‹nr.›</a:t>
+              <a:t>‹#›</a:t>
             </a:fld>
             <a:endParaRPr lang="en-US" dirty="0"/>
           </a:p>
@@ -5916,7 +5916,7 @@
             <a:fld id="{B61BEF0D-F0BB-DE4B-95CE-6DB70DBA9567}" type="datetimeFigureOut">
               <a:rPr lang="en-US" smtClean="0"/>
               <a:pPr/>
-              <a:t>2/26/2015</a:t>
+              <a:t>2/27/2015</a:t>
             </a:fld>
             <a:endParaRPr lang="en-US" dirty="0"/>
           </a:p>
@@ -5959,7 +5959,7 @@
             <a:fld id="{D57F1E4F-1CFF-5643-939E-217C01CDF565}" type="slidenum">
               <a:rPr lang="en-US" smtClean="0"/>
               <a:pPr/>
-              <a:t>‹nr.›</a:t>
+              <a:t>‹#›</a:t>
             </a:fld>
             <a:endParaRPr lang="en-US" dirty="0"/>
           </a:p>
@@ -6483,7 +6483,7 @@
             <a:fld id="{B61BEF0D-F0BB-DE4B-95CE-6DB70DBA9567}" type="datetimeFigureOut">
               <a:rPr lang="en-US" smtClean="0"/>
               <a:pPr/>
-              <a:t>2/26/2015</a:t>
+              <a:t>2/27/2015</a:t>
             </a:fld>
             <a:endParaRPr lang="en-US" dirty="0"/>
           </a:p>
@@ -6563,7 +6563,7 @@
             <a:fld id="{D57F1E4F-1CFF-5643-939E-217C01CDF565}" type="slidenum">
               <a:rPr lang="en-US" smtClean="0"/>
               <a:pPr/>
-              <a:t>‹nr.›</a:t>
+              <a:t>‹#›</a:t>
             </a:fld>
             <a:endParaRPr lang="en-US" dirty="0"/>
           </a:p>
@@ -8745,6 +8745,18 @@
           <a:p>
             <a:pPr lvl="1"/>
             <a:r>
+              <a:rPr lang="nl-NL" dirty="0" smtClean="0"/>
+              <a:t>Space </a:t>
+            </a:r>
+            <a:r>
+              <a:rPr lang="nl-NL" smtClean="0"/>
+              <a:t>used</a:t>
+            </a:r>
+            <a:endParaRPr lang="en-GB" dirty="0" smtClean="0"/>
+          </a:p>
+          <a:p>
+            <a:pPr lvl="1"/>
+            <a:r>
               <a:rPr lang="en-GB" dirty="0" smtClean="0"/>
               <a:t>Difficulty building</a:t>
             </a:r>
@@ -9100,6 +9112,55 @@
                                           <p:spTgt spid="3">
                                             <p:txEl>
                                               <p:pRg st="6" end="6"/>
+                                            </p:txEl>
+                                          </p:spTgt>
+                                        </p:tgtEl>
+                                        <p:attrNameLst>
+                                          <p:attrName>style.visibility</p:attrName>
+                                        </p:attrNameLst>
+                                      </p:cBhvr>
+                                      <p:to>
+                                        <p:strVal val="visible"/>
+                                      </p:to>
+                                    </p:set>
+                                  </p:childTnLst>
+                                </p:cTn>
+                              </p:par>
+                            </p:childTnLst>
+                          </p:cTn>
+                        </p:par>
+                      </p:childTnLst>
+                    </p:cTn>
+                  </p:par>
+                  <p:par>
+                    <p:cTn id="31" fill="hold">
+                      <p:stCondLst>
+                        <p:cond delay="indefinite"/>
+                      </p:stCondLst>
+                      <p:childTnLst>
+                        <p:par>
+                          <p:cTn id="32" fill="hold">
+                            <p:stCondLst>
+                              <p:cond delay="0"/>
+                            </p:stCondLst>
+                            <p:childTnLst>
+                              <p:par>
+                                <p:cTn id="33" presetID="1" presetClass="entr" presetSubtype="0" fill="hold" nodeType="clickEffect">
+                                  <p:stCondLst>
+                                    <p:cond delay="0"/>
+                                  </p:stCondLst>
+                                  <p:childTnLst>
+                                    <p:set>
+                                      <p:cBhvr>
+                                        <p:cTn id="34" dur="1" fill="hold">
+                                          <p:stCondLst>
+                                            <p:cond delay="0"/>
+                                          </p:stCondLst>
+                                        </p:cTn>
+                                        <p:tgtEl>
+                                          <p:spTgt spid="3">
+                                            <p:txEl>
+                                              <p:pRg st="7" end="7"/>
                                             </p:txEl>
                                           </p:spTgt>
                                         </p:tgtEl>

</xml_diff>

<commit_message>
Converted text to keywords for my part
</commit_message>
<xml_diff>
--- a/Mid-term presentation/DBL Embedded Systems.pptx
+++ b/Mid-term presentation/DBL Embedded Systems.pptx
@@ -362,7 +362,7 @@
           <a:p>
             <a:fld id="{0A96A78C-7A1B-4186-9701-837DE127F153}" type="slidenum">
               <a:rPr lang="en-GB" smtClean="0"/>
-              <a:t>‹#›</a:t>
+              <a:t>‹nr.›</a:t>
             </a:fld>
             <a:endParaRPr lang="en-GB"/>
           </a:p>
@@ -861,6 +861,347 @@
 </p:notes>
 </file>
 
+<file path=ppt/notesSlides/notesSlide4.xml><?xml version="1.0" encoding="utf-8"?>
+<p:notes xmlns:a="http://schemas.openxmlformats.org/drawingml/2006/main" xmlns:r="http://schemas.openxmlformats.org/officeDocument/2006/relationships" xmlns:p="http://schemas.openxmlformats.org/presentationml/2006/main">
+  <p:cSld>
+    <p:spTree>
+      <p:nvGrpSpPr>
+        <p:cNvPr id="1" name=""/>
+        <p:cNvGrpSpPr/>
+        <p:nvPr/>
+      </p:nvGrpSpPr>
+      <p:grpSpPr>
+        <a:xfrm>
+          <a:off x="0" y="0"/>
+          <a:ext cx="0" cy="0"/>
+          <a:chOff x="0" y="0"/>
+          <a:chExt cx="0" cy="0"/>
+        </a:xfrm>
+      </p:grpSpPr>
+      <p:sp>
+        <p:nvSpPr>
+          <p:cNvPr id="2" name="Tijdelijke aanduiding voor dia-afbeelding 1"/>
+          <p:cNvSpPr>
+            <a:spLocks noGrp="1" noRot="1" noChangeAspect="1"/>
+          </p:cNvSpPr>
+          <p:nvPr>
+            <p:ph type="sldImg"/>
+          </p:nvPr>
+        </p:nvSpPr>
+        <p:spPr/>
+      </p:sp>
+      <p:sp>
+        <p:nvSpPr>
+          <p:cNvPr id="3" name="Tijdelijke aanduiding voor notities 2"/>
+          <p:cNvSpPr>
+            <a:spLocks noGrp="1"/>
+          </p:cNvSpPr>
+          <p:nvPr>
+            <p:ph type="body" idx="1"/>
+          </p:nvPr>
+        </p:nvSpPr>
+        <p:spPr/>
+        <p:txBody>
+          <a:bodyPr/>
+          <a:lstStyle/>
+          <a:p>
+            <a:r>
+              <a:rPr lang="en-GB" sz="1200" b="1" kern="1200" dirty="0" smtClean="0">
+                <a:solidFill>
+                  <a:schemeClr val="tx1"/>
+                </a:solidFill>
+                <a:effectLst/>
+                <a:latin typeface="+mn-lt"/>
+                <a:ea typeface="+mn-ea"/>
+                <a:cs typeface="+mn-cs"/>
+              </a:rPr>
+              <a:t>Sketch</a:t>
+            </a:r>
+          </a:p>
+          <a:p>
+            <a:r>
+              <a:rPr lang="en-GB" sz="1200" kern="1200" dirty="0" smtClean="0">
+                <a:solidFill>
+                  <a:schemeClr val="tx1"/>
+                </a:solidFill>
+                <a:effectLst/>
+                <a:latin typeface="+mn-lt"/>
+                <a:ea typeface="+mn-ea"/>
+                <a:cs typeface="+mn-cs"/>
+              </a:rPr>
+              <a:t>Machine design</a:t>
+            </a:r>
+          </a:p>
+          <a:p>
+            <a:r>
+              <a:rPr lang="en-GB" sz="1200" kern="1200" dirty="0" smtClean="0">
+                <a:solidFill>
+                  <a:schemeClr val="tx1"/>
+                </a:solidFill>
+                <a:effectLst/>
+                <a:latin typeface="+mn-lt"/>
+                <a:ea typeface="+mn-ea"/>
+                <a:cs typeface="+mn-cs"/>
+              </a:rPr>
+              <a:t>use-case </a:t>
+            </a:r>
+          </a:p>
+          <a:p>
+            <a:r>
+              <a:rPr lang="en-GB" sz="1200" kern="1200" dirty="0" smtClean="0">
+                <a:solidFill>
+                  <a:schemeClr val="tx1"/>
+                </a:solidFill>
+                <a:effectLst/>
+                <a:latin typeface="+mn-lt"/>
+                <a:ea typeface="+mn-ea"/>
+                <a:cs typeface="+mn-cs"/>
+              </a:rPr>
+              <a:t>Both </a:t>
+            </a:r>
+          </a:p>
+          <a:p>
+            <a:r>
+              <a:rPr lang="en-GB" sz="1200" kern="1200" dirty="0" smtClean="0">
+                <a:solidFill>
+                  <a:schemeClr val="tx1"/>
+                </a:solidFill>
+                <a:effectLst/>
+                <a:latin typeface="+mn-lt"/>
+                <a:ea typeface="+mn-ea"/>
+                <a:cs typeface="+mn-cs"/>
+              </a:rPr>
+              <a:t>reliable </a:t>
+            </a:r>
+          </a:p>
+          <a:p>
+            <a:r>
+              <a:rPr lang="en-GB" sz="1200" kern="1200" dirty="0" smtClean="0">
+                <a:solidFill>
+                  <a:schemeClr val="tx1"/>
+                </a:solidFill>
+                <a:effectLst/>
+                <a:latin typeface="+mn-lt"/>
+                <a:ea typeface="+mn-ea"/>
+                <a:cs typeface="+mn-cs"/>
+              </a:rPr>
+              <a:t>fast </a:t>
+            </a:r>
+          </a:p>
+          <a:p>
+            <a:r>
+              <a:rPr lang="en-GB" sz="1200" kern="1200" dirty="0" smtClean="0">
+                <a:solidFill>
+                  <a:schemeClr val="tx1"/>
+                </a:solidFill>
+                <a:effectLst/>
+                <a:latin typeface="+mn-lt"/>
+                <a:ea typeface="+mn-ea"/>
+                <a:cs typeface="+mn-cs"/>
+              </a:rPr>
+              <a:t>Robustness </a:t>
+            </a:r>
+          </a:p>
+          <a:p>
+            <a:r>
+              <a:rPr lang="en-GB" sz="1200" kern="1200" dirty="0" smtClean="0">
+                <a:solidFill>
+                  <a:schemeClr val="tx1"/>
+                </a:solidFill>
+                <a:effectLst/>
+                <a:latin typeface="+mn-lt"/>
+                <a:ea typeface="+mn-ea"/>
+                <a:cs typeface="+mn-cs"/>
+              </a:rPr>
+              <a:t>user accessibility</a:t>
+            </a:r>
+          </a:p>
+          <a:p>
+            <a:r>
+              <a:rPr lang="en-GB" sz="1200" kern="1200" dirty="0" smtClean="0">
+                <a:solidFill>
+                  <a:schemeClr val="tx1"/>
+                </a:solidFill>
+                <a:effectLst/>
+                <a:latin typeface="+mn-lt"/>
+                <a:ea typeface="+mn-ea"/>
+                <a:cs typeface="+mn-cs"/>
+              </a:rPr>
+              <a:t>first design </a:t>
+            </a:r>
+          </a:p>
+          <a:p>
+            <a:r>
+              <a:rPr lang="en-GB" sz="1200" kern="1200" dirty="0" smtClean="0">
+                <a:solidFill>
+                  <a:schemeClr val="tx1"/>
+                </a:solidFill>
+                <a:effectLst/>
+                <a:latin typeface="+mn-lt"/>
+                <a:ea typeface="+mn-ea"/>
+                <a:cs typeface="+mn-cs"/>
+              </a:rPr>
+              <a:t>Wall</a:t>
+            </a:r>
+          </a:p>
+          <a:p>
+            <a:r>
+              <a:rPr lang="en-GB" sz="1200" kern="1200" dirty="0" smtClean="0">
+                <a:solidFill>
+                  <a:schemeClr val="tx1"/>
+                </a:solidFill>
+                <a:effectLst/>
+                <a:latin typeface="+mn-lt"/>
+                <a:ea typeface="+mn-ea"/>
+                <a:cs typeface="+mn-cs"/>
+              </a:rPr>
+              <a:t>second design </a:t>
+            </a:r>
+          </a:p>
+          <a:p>
+            <a:r>
+              <a:rPr lang="en-GB" sz="1200" kern="1200" dirty="0" smtClean="0">
+                <a:solidFill>
+                  <a:schemeClr val="tx1"/>
+                </a:solidFill>
+                <a:effectLst/>
+                <a:latin typeface="+mn-lt"/>
+                <a:ea typeface="+mn-ea"/>
+                <a:cs typeface="+mn-cs"/>
+              </a:rPr>
+              <a:t>use-case</a:t>
+            </a:r>
+          </a:p>
+          <a:p>
+            <a:r>
+              <a:rPr lang="en-GB" sz="1200" kern="1200" dirty="0" smtClean="0">
+                <a:solidFill>
+                  <a:schemeClr val="tx1"/>
+                </a:solidFill>
+                <a:effectLst/>
+                <a:latin typeface="+mn-lt"/>
+                <a:ea typeface="+mn-ea"/>
+                <a:cs typeface="+mn-cs"/>
+              </a:rPr>
+              <a:t>Tudor </a:t>
+            </a:r>
+          </a:p>
+          <a:p>
+            <a:r>
+              <a:rPr lang="en-GB" sz="1200" kern="1200" dirty="0" smtClean="0">
+                <a:solidFill>
+                  <a:schemeClr val="tx1"/>
+                </a:solidFill>
+                <a:effectLst/>
+                <a:latin typeface="+mn-lt"/>
+                <a:ea typeface="+mn-ea"/>
+                <a:cs typeface="+mn-cs"/>
+              </a:rPr>
+              <a:t>reliable </a:t>
+            </a:r>
+          </a:p>
+          <a:p>
+            <a:r>
+              <a:rPr lang="en-GB" sz="1200" kern="1200" dirty="0" smtClean="0">
+                <a:solidFill>
+                  <a:schemeClr val="tx1"/>
+                </a:solidFill>
+                <a:effectLst/>
+                <a:latin typeface="+mn-lt"/>
+                <a:ea typeface="+mn-ea"/>
+                <a:cs typeface="+mn-cs"/>
+              </a:rPr>
+              <a:t>speed</a:t>
+            </a:r>
+          </a:p>
+          <a:p>
+            <a:r>
+              <a:rPr lang="en-GB" sz="1200" kern="1200" dirty="0" smtClean="0">
+                <a:solidFill>
+                  <a:schemeClr val="tx1"/>
+                </a:solidFill>
+                <a:effectLst/>
+                <a:latin typeface="+mn-lt"/>
+                <a:ea typeface="+mn-ea"/>
+                <a:cs typeface="+mn-cs"/>
+              </a:rPr>
+              <a:t>Hinder, user </a:t>
+            </a:r>
+            <a:r>
+              <a:rPr lang="en-GB" sz="1200" kern="1200" dirty="0" err="1" smtClean="0">
+                <a:solidFill>
+                  <a:schemeClr val="tx1"/>
+                </a:solidFill>
+                <a:effectLst/>
+                <a:latin typeface="+mn-lt"/>
+                <a:ea typeface="+mn-ea"/>
+                <a:cs typeface="+mn-cs"/>
+              </a:rPr>
+              <a:t>accesibility</a:t>
+            </a:r>
+            <a:endParaRPr lang="en-GB" sz="1200" kern="1200" dirty="0" smtClean="0">
+              <a:solidFill>
+                <a:schemeClr val="tx1"/>
+              </a:solidFill>
+              <a:effectLst/>
+              <a:latin typeface="+mn-lt"/>
+              <a:ea typeface="+mn-ea"/>
+              <a:cs typeface="+mn-cs"/>
+            </a:endParaRPr>
+          </a:p>
+          <a:p>
+            <a:r>
+              <a:rPr lang="en-GB" sz="1200" kern="1200" dirty="0" smtClean="0">
+                <a:solidFill>
+                  <a:schemeClr val="tx1"/>
+                </a:solidFill>
+                <a:effectLst/>
+                <a:latin typeface="+mn-lt"/>
+                <a:ea typeface="+mn-ea"/>
+                <a:cs typeface="+mn-cs"/>
+              </a:rPr>
+              <a:t>chose</a:t>
+            </a:r>
+            <a:endParaRPr lang="en-GB" dirty="0"/>
+          </a:p>
+        </p:txBody>
+      </p:sp>
+      <p:sp>
+        <p:nvSpPr>
+          <p:cNvPr id="4" name="Tijdelijke aanduiding voor dianummer 3"/>
+          <p:cNvSpPr>
+            <a:spLocks noGrp="1"/>
+          </p:cNvSpPr>
+          <p:nvPr>
+            <p:ph type="sldNum" sz="quarter" idx="10"/>
+          </p:nvPr>
+        </p:nvSpPr>
+        <p:spPr/>
+        <p:txBody>
+          <a:bodyPr/>
+          <a:lstStyle/>
+          <a:p>
+            <a:fld id="{0A96A78C-7A1B-4186-9701-837DE127F153}" type="slidenum">
+              <a:rPr lang="en-GB" smtClean="0"/>
+              <a:t>5</a:t>
+            </a:fld>
+            <a:endParaRPr lang="en-GB"/>
+          </a:p>
+        </p:txBody>
+      </p:sp>
+    </p:spTree>
+    <p:extLst>
+      <p:ext uri="{BB962C8B-B14F-4D97-AF65-F5344CB8AC3E}">
+        <p14:creationId xmlns:p14="http://schemas.microsoft.com/office/powerpoint/2010/main" val="481845672"/>
+      </p:ext>
+    </p:extLst>
+  </p:cSld>
+  <p:clrMapOvr>
+    <a:masterClrMapping/>
+  </p:clrMapOvr>
+</p:notes>
+</file>
+
 <file path=ppt/slideLayouts/slideLayout1.xml><?xml version="1.0" encoding="utf-8"?>
 <p:sldLayout xmlns:a="http://schemas.openxmlformats.org/drawingml/2006/main" xmlns:r="http://schemas.openxmlformats.org/officeDocument/2006/relationships" xmlns:p="http://schemas.openxmlformats.org/presentationml/2006/main" type="title" preserve="1">
   <p:cSld name="Titeldia">
@@ -1091,7 +1432,7 @@
             <a:fld id="{D57F1E4F-1CFF-5643-939E-217C01CDF565}" type="slidenum">
               <a:rPr lang="en-US" smtClean="0"/>
               <a:pPr/>
-              <a:t>‹#›</a:t>
+              <a:t>‹nr.›</a:t>
             </a:fld>
             <a:endParaRPr lang="en-US" dirty="0"/>
           </a:p>
@@ -1368,7 +1709,7 @@
             <a:fld id="{D57F1E4F-1CFF-5643-939E-217C01CDF565}" type="slidenum">
               <a:rPr lang="en-US" smtClean="0"/>
               <a:pPr/>
-              <a:t>‹#›</a:t>
+              <a:t>‹nr.›</a:t>
             </a:fld>
             <a:endParaRPr lang="en-US" dirty="0"/>
           </a:p>
@@ -1564,7 +1905,7 @@
             <a:fld id="{D57F1E4F-1CFF-5643-939E-217C01CDF565}" type="slidenum">
               <a:rPr lang="en-US" smtClean="0"/>
               <a:pPr/>
-              <a:t>‹#›</a:t>
+              <a:t>‹nr.›</a:t>
             </a:fld>
             <a:endParaRPr lang="en-US" dirty="0"/>
           </a:p>
@@ -1839,7 +2180,7 @@
             <a:fld id="{D57F1E4F-1CFF-5643-939E-217C01CDF565}" type="slidenum">
               <a:rPr lang="en-US" smtClean="0"/>
               <a:pPr/>
-              <a:t>‹#›</a:t>
+              <a:t>‹nr.›</a:t>
             </a:fld>
             <a:endParaRPr lang="en-US" dirty="0"/>
           </a:p>
@@ -2182,7 +2523,7 @@
             <a:fld id="{D57F1E4F-1CFF-5643-939E-217C01CDF565}" type="slidenum">
               <a:rPr lang="en-US" smtClean="0"/>
               <a:pPr/>
-              <a:t>‹#›</a:t>
+              <a:t>‹nr.›</a:t>
             </a:fld>
             <a:endParaRPr lang="en-US" dirty="0"/>
           </a:p>
@@ -2807,7 +3148,7 @@
             <a:fld id="{D57F1E4F-1CFF-5643-939E-217C01CDF565}" type="slidenum">
               <a:rPr lang="en-US" smtClean="0"/>
               <a:pPr/>
-              <a:t>‹#›</a:t>
+              <a:t>‹nr.›</a:t>
             </a:fld>
             <a:endParaRPr lang="en-US" dirty="0"/>
           </a:p>
@@ -3669,7 +4010,7 @@
             <a:fld id="{D57F1E4F-1CFF-5643-939E-217C01CDF565}" type="slidenum">
               <a:rPr lang="en-US" smtClean="0"/>
               <a:pPr/>
-              <a:t>‹#›</a:t>
+              <a:t>‹nr.›</a:t>
             </a:fld>
             <a:endParaRPr lang="en-US" dirty="0"/>
           </a:p>
@@ -3841,7 +4182,7 @@
             <a:fld id="{D57F1E4F-1CFF-5643-939E-217C01CDF565}" type="slidenum">
               <a:rPr lang="en-US" smtClean="0"/>
               <a:pPr/>
-              <a:t>‹#›</a:t>
+              <a:t>‹nr.›</a:t>
             </a:fld>
             <a:endParaRPr lang="en-US" dirty="0"/>
           </a:p>
@@ -4023,7 +4364,7 @@
             <a:fld id="{D57F1E4F-1CFF-5643-939E-217C01CDF565}" type="slidenum">
               <a:rPr lang="en-US" smtClean="0"/>
               <a:pPr/>
-              <a:t>‹#›</a:t>
+              <a:t>‹nr.›</a:t>
             </a:fld>
             <a:endParaRPr lang="en-US" dirty="0"/>
           </a:p>
@@ -4195,7 +4536,7 @@
             <a:fld id="{D57F1E4F-1CFF-5643-939E-217C01CDF565}" type="slidenum">
               <a:rPr lang="en-US" smtClean="0"/>
               <a:pPr/>
-              <a:t>‹#›</a:t>
+              <a:t>‹nr.›</a:t>
             </a:fld>
             <a:endParaRPr lang="en-US" dirty="0"/>
           </a:p>
@@ -4444,7 +4785,7 @@
             <a:fld id="{D57F1E4F-1CFF-5643-939E-217C01CDF565}" type="slidenum">
               <a:rPr lang="en-US" smtClean="0"/>
               <a:pPr/>
-              <a:t>‹#›</a:t>
+              <a:t>‹nr.›</a:t>
             </a:fld>
             <a:endParaRPr lang="en-US" dirty="0"/>
           </a:p>
@@ -4738,7 +5079,7 @@
             <a:fld id="{D57F1E4F-1CFF-5643-939E-217C01CDF565}" type="slidenum">
               <a:rPr lang="en-US" smtClean="0"/>
               <a:pPr/>
-              <a:t>‹#›</a:t>
+              <a:t>‹nr.›</a:t>
             </a:fld>
             <a:endParaRPr lang="en-US" dirty="0"/>
           </a:p>
@@ -5184,7 +5525,7 @@
             <a:fld id="{D57F1E4F-1CFF-5643-939E-217C01CDF565}" type="slidenum">
               <a:rPr lang="en-US" smtClean="0"/>
               <a:pPr/>
-              <a:t>‹#›</a:t>
+              <a:t>‹nr.›</a:t>
             </a:fld>
             <a:endParaRPr lang="en-US" dirty="0"/>
           </a:p>
@@ -5304,7 +5645,7 @@
             <a:fld id="{D57F1E4F-1CFF-5643-939E-217C01CDF565}" type="slidenum">
               <a:rPr lang="en-US" smtClean="0"/>
               <a:pPr/>
-              <a:t>‹#›</a:t>
+              <a:t>‹nr.›</a:t>
             </a:fld>
             <a:endParaRPr lang="en-US" dirty="0"/>
           </a:p>
@@ -5401,7 +5742,7 @@
             <a:fld id="{D57F1E4F-1CFF-5643-939E-217C01CDF565}" type="slidenum">
               <a:rPr lang="en-US" smtClean="0"/>
               <a:pPr/>
-              <a:t>‹#›</a:t>
+              <a:t>‹nr.›</a:t>
             </a:fld>
             <a:endParaRPr lang="en-US" dirty="0"/>
           </a:p>
@@ -5682,7 +6023,7 @@
             <a:fld id="{D57F1E4F-1CFF-5643-939E-217C01CDF565}" type="slidenum">
               <a:rPr lang="en-US" smtClean="0"/>
               <a:pPr/>
-              <a:t>‹#›</a:t>
+              <a:t>‹nr.›</a:t>
             </a:fld>
             <a:endParaRPr lang="en-US" dirty="0"/>
           </a:p>
@@ -5959,7 +6300,7 @@
             <a:fld id="{D57F1E4F-1CFF-5643-939E-217C01CDF565}" type="slidenum">
               <a:rPr lang="en-US" smtClean="0"/>
               <a:pPr/>
-              <a:t>‹#›</a:t>
+              <a:t>‹nr.›</a:t>
             </a:fld>
             <a:endParaRPr lang="en-US" dirty="0"/>
           </a:p>
@@ -6563,7 +6904,7 @@
             <a:fld id="{D57F1E4F-1CFF-5643-939E-217C01CDF565}" type="slidenum">
               <a:rPr lang="en-US" smtClean="0"/>
               <a:pPr/>
-              <a:t>‹#›</a:t>
+              <a:t>‹nr.›</a:t>
             </a:fld>
             <a:endParaRPr lang="en-US" dirty="0"/>
           </a:p>
@@ -8355,7 +8696,7 @@
           </p:nvPr>
         </p:nvPicPr>
         <p:blipFill>
-          <a:blip r:embed="rId2">
+          <a:blip r:embed="rId3">
             <a:extLst>
               <a:ext uri="{28A0092B-C50C-407E-A947-70E740481C1C}">
                 <a14:useLocalDpi xmlns:a14="http://schemas.microsoft.com/office/drawing/2010/main" val="0"/>
@@ -8382,7 +8723,7 @@
           <p:nvPr/>
         </p:nvPicPr>
         <p:blipFill>
-          <a:blip r:embed="rId3">
+          <a:blip r:embed="rId4">
             <a:extLst>
               <a:ext uri="{28A0092B-C50C-407E-A947-70E740481C1C}">
                 <a14:useLocalDpi xmlns:a14="http://schemas.microsoft.com/office/drawing/2010/main" val="0"/>

</xml_diff>